<commit_message>
added framework, container & more information
</commit_message>
<xml_diff>
--- a/doc/Java EE - Security.pptx
+++ b/doc/Java EE - Security.pptx
@@ -5,7 +5,7 @@
     <p:sldMasterId id="2147483671" r:id="rId1"/>
   </p:sldMasterIdLst>
   <p:notesMasterIdLst>
-    <p:notesMasterId r:id="rId28"/>
+    <p:notesMasterId r:id="rId31"/>
   </p:notesMasterIdLst>
   <p:sldIdLst>
     <p:sldId id="256" r:id="rId2"/>
@@ -17,23 +17,26 @@
     <p:sldId id="281" r:id="rId8"/>
     <p:sldId id="257" r:id="rId9"/>
     <p:sldId id="263" r:id="rId10"/>
-    <p:sldId id="259" r:id="rId11"/>
-    <p:sldId id="268" r:id="rId12"/>
-    <p:sldId id="270" r:id="rId13"/>
-    <p:sldId id="271" r:id="rId14"/>
-    <p:sldId id="261" r:id="rId15"/>
-    <p:sldId id="260" r:id="rId16"/>
-    <p:sldId id="275" r:id="rId17"/>
-    <p:sldId id="276" r:id="rId18"/>
-    <p:sldId id="273" r:id="rId19"/>
-    <p:sldId id="282" r:id="rId20"/>
-    <p:sldId id="283" r:id="rId21"/>
-    <p:sldId id="284" r:id="rId22"/>
-    <p:sldId id="265" r:id="rId23"/>
-    <p:sldId id="266" r:id="rId24"/>
-    <p:sldId id="267" r:id="rId25"/>
-    <p:sldId id="262" r:id="rId26"/>
-    <p:sldId id="272" r:id="rId27"/>
+    <p:sldId id="288" r:id="rId11"/>
+    <p:sldId id="259" r:id="rId12"/>
+    <p:sldId id="268" r:id="rId13"/>
+    <p:sldId id="270" r:id="rId14"/>
+    <p:sldId id="271" r:id="rId15"/>
+    <p:sldId id="261" r:id="rId16"/>
+    <p:sldId id="260" r:id="rId17"/>
+    <p:sldId id="275" r:id="rId18"/>
+    <p:sldId id="276" r:id="rId19"/>
+    <p:sldId id="273" r:id="rId20"/>
+    <p:sldId id="282" r:id="rId21"/>
+    <p:sldId id="283" r:id="rId22"/>
+    <p:sldId id="284" r:id="rId23"/>
+    <p:sldId id="265" r:id="rId24"/>
+    <p:sldId id="287" r:id="rId25"/>
+    <p:sldId id="286" r:id="rId26"/>
+    <p:sldId id="285" r:id="rId27"/>
+    <p:sldId id="266" r:id="rId28"/>
+    <p:sldId id="262" r:id="rId29"/>
+    <p:sldId id="272" r:id="rId30"/>
   </p:sldIdLst>
   <p:sldSz cx="12192000" cy="6858000"/>
   <p:notesSz cx="6858000" cy="9144000"/>
@@ -3660,7 +3663,7 @@
           <a:p>
             <a:fld id="{560D6F24-109C-42D3-BF90-9BF72925201E}" type="slidenum">
               <a:rPr lang="de-AT" smtClean="0"/>
-              <a:t>‹#›</a:t>
+              <a:t>‹Nr.›</a:t>
             </a:fld>
             <a:endParaRPr lang="de-AT"/>
           </a:p>
@@ -4086,91 +4089,7 @@
           <a:p>
             <a:fld id="{560D6F24-109C-42D3-BF90-9BF72925201E}" type="slidenum">
               <a:rPr lang="de-AT" smtClean="0"/>
-              <a:t>24</a:t>
-            </a:fld>
-            <a:endParaRPr lang="de-AT"/>
-          </a:p>
-        </p:txBody>
-      </p:sp>
-    </p:spTree>
-    <p:extLst>
-      <p:ext uri="{BB962C8B-B14F-4D97-AF65-F5344CB8AC3E}">
-        <p14:creationId xmlns:p14="http://schemas.microsoft.com/office/powerpoint/2010/main" val="4108727258"/>
-      </p:ext>
-    </p:extLst>
-  </p:cSld>
-  <p:clrMapOvr>
-    <a:masterClrMapping/>
-  </p:clrMapOvr>
-</p:notes>
-</file>
-
-<file path=ppt/notesSlides/notesSlide5.xml><?xml version="1.0" encoding="utf-8"?>
-<p:notes xmlns:a="http://schemas.openxmlformats.org/drawingml/2006/main" xmlns:r="http://schemas.openxmlformats.org/officeDocument/2006/relationships" xmlns:p="http://schemas.openxmlformats.org/presentationml/2006/main">
-  <p:cSld>
-    <p:spTree>
-      <p:nvGrpSpPr>
-        <p:cNvPr id="1" name=""/>
-        <p:cNvGrpSpPr/>
-        <p:nvPr/>
-      </p:nvGrpSpPr>
-      <p:grpSpPr>
-        <a:xfrm>
-          <a:off x="0" y="0"/>
-          <a:ext cx="0" cy="0"/>
-          <a:chOff x="0" y="0"/>
-          <a:chExt cx="0" cy="0"/>
-        </a:xfrm>
-      </p:grpSpPr>
-      <p:sp>
-        <p:nvSpPr>
-          <p:cNvPr id="2" name="Folienbildplatzhalter 1"/>
-          <p:cNvSpPr>
-            <a:spLocks noGrp="1" noRot="1" noChangeAspect="1"/>
-          </p:cNvSpPr>
-          <p:nvPr>
-            <p:ph type="sldImg"/>
-          </p:nvPr>
-        </p:nvSpPr>
-        <p:spPr/>
-      </p:sp>
-      <p:sp>
-        <p:nvSpPr>
-          <p:cNvPr id="3" name="Notizenplatzhalter 2"/>
-          <p:cNvSpPr>
-            <a:spLocks noGrp="1"/>
-          </p:cNvSpPr>
-          <p:nvPr>
-            <p:ph type="body" idx="1"/>
-          </p:nvPr>
-        </p:nvSpPr>
-        <p:spPr/>
-        <p:txBody>
-          <a:bodyPr/>
-          <a:lstStyle/>
-          <a:p>
-            <a:endParaRPr lang="de-AT" dirty="0"/>
-          </a:p>
-        </p:txBody>
-      </p:sp>
-      <p:sp>
-        <p:nvSpPr>
-          <p:cNvPr id="4" name="Foliennummernplatzhalter 3"/>
-          <p:cNvSpPr>
-            <a:spLocks noGrp="1"/>
-          </p:cNvSpPr>
-          <p:nvPr>
-            <p:ph type="sldNum" sz="quarter" idx="10"/>
-          </p:nvPr>
-        </p:nvSpPr>
-        <p:spPr/>
-        <p:txBody>
-          <a:bodyPr/>
-          <a:lstStyle/>
-          <a:p>
-            <a:fld id="{560D6F24-109C-42D3-BF90-9BF72925201E}" type="slidenum">
-              <a:rPr lang="de-AT" smtClean="0"/>
-              <a:t>25</a:t>
+              <a:t>28</a:t>
             </a:fld>
             <a:endParaRPr lang="de-AT"/>
           </a:p>
@@ -4518,7 +4437,7 @@
           <a:p>
             <a:fld id="{D57F1E4F-1CFF-5643-939E-02111984F565}" type="slidenum">
               <a:rPr lang="en-US" smtClean="0"/>
-              <a:t>‹#›</a:t>
+              <a:t>‹Nr.›</a:t>
             </a:fld>
             <a:endParaRPr lang="en-US" dirty="0"/>
           </a:p>
@@ -4867,7 +4786,7 @@
           <a:p>
             <a:fld id="{D57F1E4F-1CFF-5643-939E-02111984F565}" type="slidenum">
               <a:rPr lang="en-US" smtClean="0"/>
-              <a:t>‹#›</a:t>
+              <a:t>‹Nr.›</a:t>
             </a:fld>
             <a:endParaRPr lang="en-US" dirty="0"/>
           </a:p>
@@ -5272,7 +5191,7 @@
           <a:p>
             <a:fld id="{D57F1E4F-1CFF-5643-939E-02111984F565}" type="slidenum">
               <a:rPr lang="en-US" smtClean="0"/>
-              <a:t>‹#›</a:t>
+              <a:t>‹Nr.›</a:t>
             </a:fld>
             <a:endParaRPr lang="en-US" dirty="0"/>
           </a:p>
@@ -5612,7 +5531,7 @@
           <a:p>
             <a:fld id="{D57F1E4F-1CFF-5643-939E-02111984F565}" type="slidenum">
               <a:rPr lang="en-US" smtClean="0"/>
-              <a:t>‹#›</a:t>
+              <a:t>‹Nr.›</a:t>
             </a:fld>
             <a:endParaRPr lang="en-US" dirty="0"/>
           </a:p>
@@ -5936,7 +5855,7 @@
           <a:p>
             <a:fld id="{D57F1E4F-1CFF-5643-939E-02111984F565}" type="slidenum">
               <a:rPr lang="en-US" smtClean="0"/>
-              <a:t>‹#›</a:t>
+              <a:t>‹Nr.›</a:t>
             </a:fld>
             <a:endParaRPr lang="en-US" dirty="0"/>
           </a:p>
@@ -6336,7 +6255,7 @@
           <a:p>
             <a:fld id="{D57F1E4F-1CFF-5643-939E-02111984F565}" type="slidenum">
               <a:rPr lang="en-US" smtClean="0"/>
-              <a:t>‹#›</a:t>
+              <a:t>‹Nr.›</a:t>
             </a:fld>
             <a:endParaRPr lang="en-US" dirty="0"/>
           </a:p>
@@ -6592,7 +6511,7 @@
           <a:p>
             <a:fld id="{D57F1E4F-1CFF-5643-939E-02111984F565}" type="slidenum">
               <a:rPr lang="en-US" smtClean="0"/>
-              <a:t>‹#›</a:t>
+              <a:t>‹Nr.›</a:t>
             </a:fld>
             <a:endParaRPr lang="en-US" dirty="0"/>
           </a:p>
@@ -6858,7 +6777,7 @@
           <a:p>
             <a:fld id="{D57F1E4F-1CFF-5643-939E-02111984F565}" type="slidenum">
               <a:rPr lang="en-US" smtClean="0"/>
-              <a:t>‹#›</a:t>
+              <a:t>‹Nr.›</a:t>
             </a:fld>
             <a:endParaRPr lang="en-US" dirty="0"/>
           </a:p>
@@ -7150,7 +7069,7 @@
           <a:p>
             <a:fld id="{D57F1E4F-1CFF-5643-939E-02111984F565}" type="slidenum">
               <a:rPr lang="en-US" smtClean="0"/>
-              <a:t>‹#›</a:t>
+              <a:t>‹Nr.›</a:t>
             </a:fld>
             <a:endParaRPr lang="en-US" dirty="0"/>
           </a:p>
@@ -7503,7 +7422,7 @@
           <a:p>
             <a:fld id="{D57F1E4F-1CFF-5643-939E-02111984F565}" type="slidenum">
               <a:rPr lang="en-US" smtClean="0"/>
-              <a:t>‹#›</a:t>
+              <a:t>‹Nr.›</a:t>
             </a:fld>
             <a:endParaRPr lang="en-US" dirty="0"/>
           </a:p>
@@ -7845,7 +7764,7 @@
           <a:p>
             <a:fld id="{D57F1E4F-1CFF-5643-939E-02111984F565}" type="slidenum">
               <a:rPr lang="en-US" smtClean="0"/>
-              <a:t>‹#›</a:t>
+              <a:t>‹Nr.›</a:t>
             </a:fld>
             <a:endParaRPr lang="en-US" dirty="0"/>
           </a:p>
@@ -8321,7 +8240,7 @@
           <a:p>
             <a:fld id="{D57F1E4F-1CFF-5643-939E-02111984F565}" type="slidenum">
               <a:rPr lang="en-US" smtClean="0"/>
-              <a:t>‹#›</a:t>
+              <a:t>‹Nr.›</a:t>
             </a:fld>
             <a:endParaRPr lang="en-US" dirty="0"/>
           </a:p>
@@ -8540,7 +8459,7 @@
           <a:p>
             <a:fld id="{D57F1E4F-1CFF-5643-939E-02111984F565}" type="slidenum">
               <a:rPr lang="en-US" smtClean="0"/>
-              <a:t>‹#›</a:t>
+              <a:t>‹Nr.›</a:t>
             </a:fld>
             <a:endParaRPr lang="en-US" dirty="0"/>
           </a:p>
@@ -8732,7 +8651,7 @@
           <a:p>
             <a:fld id="{D57F1E4F-1CFF-5643-939E-02111984F565}" type="slidenum">
               <a:rPr lang="en-US" smtClean="0"/>
-              <a:t>‹#›</a:t>
+              <a:t>‹Nr.›</a:t>
             </a:fld>
             <a:endParaRPr lang="en-US" dirty="0"/>
           </a:p>
@@ -9076,7 +8995,7 @@
           <a:p>
             <a:fld id="{D57F1E4F-1CFF-5643-939E-02111984F565}" type="slidenum">
               <a:rPr lang="en-US" smtClean="0"/>
-              <a:t>‹#›</a:t>
+              <a:t>‹Nr.›</a:t>
             </a:fld>
             <a:endParaRPr lang="en-US" dirty="0"/>
           </a:p>
@@ -9430,7 +9349,7 @@
           <a:p>
             <a:fld id="{D57F1E4F-1CFF-5643-939E-02111984F565}" type="slidenum">
               <a:rPr lang="en-US" smtClean="0"/>
-              <a:t>‹#›</a:t>
+              <a:t>‹Nr.›</a:t>
             </a:fld>
             <a:endParaRPr lang="en-US" dirty="0"/>
           </a:p>
@@ -11498,7 +11417,7 @@
           <a:p>
             <a:fld id="{D57F1E4F-1CFF-5643-939E-02111984F565}" type="slidenum">
               <a:rPr lang="en-US" smtClean="0"/>
-              <a:t>‹#›</a:t>
+              <a:t>‹Nr.›</a:t>
             </a:fld>
             <a:endParaRPr lang="en-US" dirty="0"/>
           </a:p>
@@ -12048,7 +11967,7 @@
           <a:p>
             <a:r>
               <a:rPr lang="en-US" dirty="0" smtClean="0"/>
-              <a:t>Ari Ayvazyan, Adrian Bergler, Java EE Security</a:t>
+              <a:t> </a:t>
             </a:r>
             <a:endParaRPr lang="en-US" dirty="0"/>
           </a:p>
@@ -12129,11 +12048,41 @@
           <a:bodyPr/>
           <a:lstStyle/>
           <a:p>
-            <a:r>
-              <a:rPr lang="en-US" noProof="0" dirty="0" smtClean="0"/>
-              <a:t>Deployment Descriptors</a:t>
-            </a:r>
-            <a:endParaRPr lang="en-US" noProof="0" dirty="0"/>
+            <a:pPr marL="0" marR="0" indent="0" algn="l" defTabSz="457200" rtl="0" eaLnBrk="1" fontAlgn="auto" latinLnBrk="0" hangingPunct="1">
+              <a:lnSpc>
+                <a:spcPct val="100000"/>
+              </a:lnSpc>
+              <a:spcBef>
+                <a:spcPct val="0"/>
+              </a:spcBef>
+              <a:spcAft>
+                <a:spcPts val="0"/>
+              </a:spcAft>
+              <a:buClrTx/>
+              <a:buSzTx/>
+              <a:buFontTx/>
+              <a:buNone/>
+              <a:tabLst/>
+              <a:defRPr/>
+            </a:pPr>
+            <a:r>
+              <a:rPr lang="en-US" sz="3600" kern="1200" dirty="0" smtClean="0">
+                <a:solidFill>
+                  <a:schemeClr val="tx1">
+                    <a:lumMod val="85000"/>
+                    <a:lumOff val="15000"/>
+                  </a:schemeClr>
+                </a:solidFill>
+                <a:effectLst/>
+                <a:latin typeface="+mj-lt"/>
+                <a:ea typeface="+mj-ea"/>
+                <a:cs typeface="+mj-cs"/>
+              </a:rPr>
+              <a:t>Authentication &amp; Authorization</a:t>
+            </a:r>
+            <a:endParaRPr lang="de-AT" sz="3600" dirty="0" smtClean="0">
+              <a:effectLst/>
+            </a:endParaRPr>
           </a:p>
         </p:txBody>
       </p:sp>
@@ -12149,68 +12098,62 @@
         </p:nvSpPr>
         <p:spPr/>
         <p:txBody>
-          <a:bodyPr>
-            <a:normAutofit fontScale="92500" lnSpcReduction="10000"/>
-          </a:bodyPr>
-          <a:lstStyle/>
-          <a:p>
+          <a:bodyPr/>
+          <a:lstStyle/>
+          <a:p>
+            <a:r>
+              <a:rPr lang="en-US" b="1" dirty="0" smtClean="0"/>
+              <a:t>Authentication</a:t>
+            </a:r>
+          </a:p>
+          <a:p>
+            <a:pPr lvl="1"/>
+            <a:r>
+              <a:rPr lang="en-US" i="1" dirty="0"/>
+              <a:t>Who are you?</a:t>
+            </a:r>
+            <a:endParaRPr lang="en-US" i="1" dirty="0" smtClean="0"/>
+          </a:p>
+          <a:p>
+            <a:pPr lvl="1"/>
             <a:r>
               <a:rPr lang="en-US" dirty="0" smtClean="0"/>
-              <a:t>Describes how the Application should be Deployed.</a:t>
-            </a:r>
-          </a:p>
-          <a:p>
+              <a:t>Identification</a:t>
+            </a:r>
+            <a:endParaRPr lang="en-US" dirty="0"/>
+          </a:p>
+          <a:p>
+            <a:pPr lvl="1"/>
+            <a:endParaRPr lang="en-US" dirty="0" smtClean="0"/>
+          </a:p>
+          <a:p>
+            <a:r>
+              <a:rPr lang="en-US" b="1" dirty="0" smtClean="0"/>
+              <a:t>Authorization</a:t>
+            </a:r>
+          </a:p>
+          <a:p>
+            <a:pPr lvl="1"/>
+            <a:r>
+              <a:rPr lang="en-US" i="1" dirty="0" smtClean="0"/>
+              <a:t>What are you allowed to do?</a:t>
+            </a:r>
+          </a:p>
+          <a:p>
+            <a:pPr lvl="1"/>
             <a:r>
               <a:rPr lang="en-US" dirty="0" smtClean="0"/>
-              <a:t>Defines Security Constraints</a:t>
-            </a:r>
-          </a:p>
-          <a:p>
-            <a:pPr lvl="1"/>
+              <a:t>Assignment of Permissions to a </a:t>
+            </a:r>
+            <a:r>
+              <a:rPr lang="en-US" b="1" i="1" dirty="0" smtClean="0"/>
+              <a:t>Authenticated</a:t>
+            </a:r>
             <a:r>
               <a:rPr lang="en-US" dirty="0" smtClean="0"/>
-              <a:t>Protected Information</a:t>
-            </a:r>
-          </a:p>
-          <a:p>
-            <a:pPr lvl="1"/>
-            <a:r>
-              <a:rPr lang="en-US" dirty="0" smtClean="0"/>
-              <a:t>Probably SSL</a:t>
-            </a:r>
-          </a:p>
-          <a:p>
-            <a:pPr lvl="1"/>
-            <a:r>
-              <a:rPr lang="en-US" dirty="0" smtClean="0"/>
-              <a:t>Specify which user may access them</a:t>
-            </a:r>
-          </a:p>
-          <a:p>
-            <a:r>
-              <a:rPr lang="en-US" dirty="0" smtClean="0"/>
-              <a:t>XML-Files</a:t>
-            </a:r>
-          </a:p>
-          <a:p>
-            <a:r>
-              <a:rPr lang="en-US" dirty="0" smtClean="0"/>
-              <a:t>Usually located in /WEB-INF/</a:t>
-            </a:r>
-          </a:p>
-          <a:p>
-            <a:pPr lvl="1"/>
-            <a:r>
-              <a:rPr lang="en-US" dirty="0" smtClean="0"/>
-              <a:t>web.xml</a:t>
-            </a:r>
-          </a:p>
-          <a:p>
-            <a:pPr lvl="1"/>
-            <a:r>
-              <a:rPr lang="en-US" dirty="0" smtClean="0"/>
-              <a:t>Vendor-specific.xml (E.g. Glassfish: glassfish-web.xml)</a:t>
-            </a:r>
+              <a:t> User</a:t>
+            </a:r>
+            <a:endParaRPr lang="en-US" dirty="0"/>
           </a:p>
         </p:txBody>
       </p:sp>
@@ -12229,7 +12172,7 @@
           <a:bodyPr/>
           <a:lstStyle/>
           <a:p>
-            <a:fld id="{4A91D300-0263-4546-9E1B-4FBB24987E84}" type="datetime1">
+            <a:fld id="{876F5003-B5C3-462A-92A3-05F7AF44974A}" type="datetime1">
               <a:rPr lang="de-AT" smtClean="0"/>
               <a:t>13.02.2015</a:t>
             </a:fld>
@@ -12286,7 +12229,7 @@
     </p:spTree>
     <p:extLst>
       <p:ext uri="{BB962C8B-B14F-4D97-AF65-F5344CB8AC3E}">
-        <p14:creationId xmlns:p14="http://schemas.microsoft.com/office/powerpoint/2010/main" val="3298015676"/>
+        <p14:creationId xmlns:p14="http://schemas.microsoft.com/office/powerpoint/2010/main" val="2739382114"/>
       </p:ext>
     </p:extLst>
   </p:cSld>
@@ -12339,18 +12282,7 @@
               <a:rPr lang="en-US" noProof="0" dirty="0" smtClean="0"/>
               <a:t>Deployment Descriptors</a:t>
             </a:r>
-            <a:br>
-              <a:rPr lang="en-US" noProof="0" dirty="0" smtClean="0"/>
-            </a:br>
-            <a:r>
-              <a:rPr lang="en-US" b="1" noProof="0" dirty="0" smtClean="0"/>
-              <a:t>w</a:t>
-            </a:r>
-            <a:r>
-              <a:rPr lang="en-US" b="1" dirty="0" smtClean="0"/>
-              <a:t>eb.xml</a:t>
-            </a:r>
-            <a:endParaRPr lang="en-US" b="1" noProof="0" dirty="0"/>
+            <a:endParaRPr lang="en-US" noProof="0" dirty="0"/>
           </a:p>
         </p:txBody>
       </p:sp>
@@ -12367,25 +12299,66 @@
         <p:spPr/>
         <p:txBody>
           <a:bodyPr>
-            <a:normAutofit/>
+            <a:normAutofit fontScale="92500" lnSpcReduction="10000"/>
           </a:bodyPr>
           <a:lstStyle/>
           <a:p>
             <a:r>
               <a:rPr lang="en-US" dirty="0" smtClean="0"/>
-              <a:t>Protected Resources</a:t>
+              <a:t>Describes how the Application should be Deployed.</a:t>
             </a:r>
           </a:p>
           <a:p>
             <a:r>
               <a:rPr lang="en-US" dirty="0" smtClean="0"/>
-              <a:t>Security Roles</a:t>
-            </a:r>
-          </a:p>
-          <a:p>
+              <a:t>Defines Security Constraints</a:t>
+            </a:r>
+          </a:p>
+          <a:p>
+            <a:pPr lvl="1"/>
             <a:r>
               <a:rPr lang="en-US" dirty="0" smtClean="0"/>
-              <a:t>Authentication methods</a:t>
+              <a:t>Protected Information</a:t>
+            </a:r>
+          </a:p>
+          <a:p>
+            <a:pPr lvl="1"/>
+            <a:r>
+              <a:rPr lang="en-US" dirty="0" smtClean="0"/>
+              <a:t>Probably SSL</a:t>
+            </a:r>
+          </a:p>
+          <a:p>
+            <a:pPr lvl="1"/>
+            <a:r>
+              <a:rPr lang="en-US" dirty="0" smtClean="0"/>
+              <a:t>Specify which user may access them</a:t>
+            </a:r>
+          </a:p>
+          <a:p>
+            <a:r>
+              <a:rPr lang="en-US" dirty="0" smtClean="0"/>
+              <a:t>XML-Files</a:t>
+            </a:r>
+          </a:p>
+          <a:p>
+            <a:r>
+              <a:rPr lang="en-US" dirty="0" smtClean="0"/>
+              <a:t>Usually located in /WEB-INF/</a:t>
+            </a:r>
+          </a:p>
+          <a:p>
+            <a:pPr lvl="1"/>
+            <a:r>
+              <a:rPr lang="en-US" dirty="0" smtClean="0"/>
+              <a:t>web.xml</a:t>
+            </a:r>
+          </a:p>
+          <a:p>
+            <a:pPr lvl="1"/>
+            <a:r>
+              <a:rPr lang="en-US" dirty="0" smtClean="0"/>
+              <a:t>Vendor-specific.xml (E.g. Glassfish: glassfish-web.xml)</a:t>
             </a:r>
           </a:p>
         </p:txBody>
@@ -12405,7 +12378,7 @@
           <a:bodyPr/>
           <a:lstStyle/>
           <a:p>
-            <a:fld id="{F80268E5-4EB8-43AB-871E-B268C39F6684}" type="datetime1">
+            <a:fld id="{4A91D300-0263-4546-9E1B-4FBB24987E84}" type="datetime1">
               <a:rPr lang="de-AT" smtClean="0"/>
               <a:t>13.02.2015</a:t>
             </a:fld>
@@ -12462,7 +12435,7 @@
     </p:spTree>
     <p:extLst>
       <p:ext uri="{BB962C8B-B14F-4D97-AF65-F5344CB8AC3E}">
-        <p14:creationId xmlns:p14="http://schemas.microsoft.com/office/powerpoint/2010/main" val="1512171935"/>
+        <p14:creationId xmlns:p14="http://schemas.microsoft.com/office/powerpoint/2010/main" val="3298015676"/>
       </p:ext>
     </p:extLst>
   </p:cSld>
@@ -12512,60 +12485,57 @@
           <a:lstStyle/>
           <a:p>
             <a:r>
+              <a:rPr lang="en-US" noProof="0" dirty="0" smtClean="0"/>
+              <a:t>Deployment Descriptors</a:t>
+            </a:r>
+            <a:br>
+              <a:rPr lang="en-US" noProof="0" dirty="0" smtClean="0"/>
+            </a:br>
+            <a:r>
+              <a:rPr lang="en-US" b="1" noProof="0" dirty="0" smtClean="0"/>
+              <a:t>w</a:t>
+            </a:r>
+            <a:r>
+              <a:rPr lang="en-US" b="1" dirty="0" smtClean="0"/>
+              <a:t>eb.xml</a:t>
+            </a:r>
+            <a:endParaRPr lang="en-US" b="1" noProof="0" dirty="0"/>
+          </a:p>
+        </p:txBody>
+      </p:sp>
+      <p:sp>
+        <p:nvSpPr>
+          <p:cNvPr id="3" name="Inhaltsplatzhalter 2"/>
+          <p:cNvSpPr>
+            <a:spLocks noGrp="1"/>
+          </p:cNvSpPr>
+          <p:nvPr>
+            <p:ph idx="1"/>
+          </p:nvPr>
+        </p:nvSpPr>
+        <p:spPr/>
+        <p:txBody>
+          <a:bodyPr>
+            <a:normAutofit/>
+          </a:bodyPr>
+          <a:lstStyle/>
+          <a:p>
+            <a:r>
               <a:rPr lang="en-US" dirty="0" smtClean="0"/>
-              <a:t>Deployment Descriptors</a:t>
-            </a:r>
-            <a:r>
-              <a:rPr lang="en-US" b="1" dirty="0" smtClean="0"/>
-              <a:t/>
-            </a:r>
-            <a:br>
-              <a:rPr lang="en-US" b="1" dirty="0" smtClean="0"/>
-            </a:br>
-            <a:r>
-              <a:rPr lang="en-US" b="1" dirty="0" smtClean="0"/>
-              <a:t>(vendor-specific).xml</a:t>
-            </a:r>
-            <a:endParaRPr lang="de-AT" dirty="0"/>
-          </a:p>
-        </p:txBody>
-      </p:sp>
-      <p:sp>
-        <p:nvSpPr>
-          <p:cNvPr id="3" name="Inhaltsplatzhalter 2"/>
-          <p:cNvSpPr>
-            <a:spLocks noGrp="1"/>
-          </p:cNvSpPr>
-          <p:nvPr>
-            <p:ph idx="1"/>
-          </p:nvPr>
-        </p:nvSpPr>
-        <p:spPr/>
-        <p:txBody>
-          <a:bodyPr/>
-          <a:lstStyle/>
+              <a:t>Protected Resources</a:t>
+            </a:r>
+          </a:p>
           <a:p>
             <a:r>
               <a:rPr lang="en-US" dirty="0" smtClean="0"/>
-              <a:t>User – Role mapping</a:t>
+              <a:t>Security Roles</a:t>
             </a:r>
           </a:p>
           <a:p>
             <a:r>
               <a:rPr lang="en-US" dirty="0" smtClean="0"/>
-              <a:t>Group – Role mapping</a:t>
-            </a:r>
-            <a:endParaRPr lang="de-AT" dirty="0" smtClean="0"/>
-          </a:p>
-          <a:p>
-            <a:endParaRPr lang="en-US" dirty="0" smtClean="0"/>
-          </a:p>
-          <a:p>
-            <a:r>
-              <a:rPr lang="en-US" dirty="0" smtClean="0"/>
-              <a:t>Vendor specific settings</a:t>
-            </a:r>
-            <a:endParaRPr lang="en-US" dirty="0"/>
+              <a:t>Authentication methods</a:t>
+            </a:r>
           </a:p>
         </p:txBody>
       </p:sp>
@@ -12584,7 +12554,7 @@
           <a:bodyPr/>
           <a:lstStyle/>
           <a:p>
-            <a:fld id="{13E9B43B-4503-4062-9B5D-FB31BFAFE538}" type="datetime1">
+            <a:fld id="{F80268E5-4EB8-43AB-871E-B268C39F6684}" type="datetime1">
               <a:rPr lang="de-AT" smtClean="0"/>
               <a:t>13.02.2015</a:t>
             </a:fld>
@@ -12641,7 +12611,7 @@
     </p:spTree>
     <p:extLst>
       <p:ext uri="{BB962C8B-B14F-4D97-AF65-F5344CB8AC3E}">
-        <p14:creationId xmlns:p14="http://schemas.microsoft.com/office/powerpoint/2010/main" val="1582227091"/>
+        <p14:creationId xmlns:p14="http://schemas.microsoft.com/office/powerpoint/2010/main" val="1512171935"/>
       </p:ext>
     </p:extLst>
   </p:cSld>
@@ -12691,19 +12661,27 @@
           <a:lstStyle/>
           <a:p>
             <a:r>
-              <a:rPr lang="en-US" sz="3600" kern="1200" dirty="0" smtClean="0">
-                <a:solidFill>
-                  <a:schemeClr val="tx1">
-                    <a:lumMod val="85000"/>
-                    <a:lumOff val="15000"/>
-                  </a:schemeClr>
-                </a:solidFill>
-                <a:effectLst/>
-                <a:latin typeface="+mj-lt"/>
-                <a:ea typeface="+mj-ea"/>
-                <a:cs typeface="+mj-cs"/>
-              </a:rPr>
-              <a:t>Principals, Credential</a:t>
+              <a:rPr lang="en-US" dirty="0" smtClean="0"/>
+              <a:t>Deployment Descriptors</a:t>
+            </a:r>
+            <a:r>
+              <a:rPr lang="en-US" b="1" dirty="0" smtClean="0"/>
+              <a:t/>
+            </a:r>
+            <a:br>
+              <a:rPr lang="en-US" b="1" dirty="0" smtClean="0"/>
+            </a:br>
+            <a:r>
+              <a:rPr lang="en-US" b="1" dirty="0" smtClean="0"/>
+              <a:t>(</a:t>
+            </a:r>
+            <a:r>
+              <a:rPr lang="en-US" b="1" dirty="0" smtClean="0"/>
+              <a:t>vendor-specific</a:t>
+            </a:r>
+            <a:r>
+              <a:rPr lang="en-US" b="1" dirty="0" smtClean="0"/>
+              <a:t>).xml</a:t>
             </a:r>
             <a:endParaRPr lang="de-AT" dirty="0"/>
           </a:p>
@@ -12726,53 +12704,33 @@
           <a:p>
             <a:r>
               <a:rPr lang="en-US" dirty="0" smtClean="0"/>
-              <a:t>A </a:t>
+              <a:t>User – Role mapping</a:t>
+            </a:r>
+          </a:p>
+          <a:p>
+            <a:r>
+              <a:rPr lang="en-US" dirty="0" smtClean="0"/>
+              <a:t>Group – Role mapping</a:t>
+            </a:r>
+            <a:endParaRPr lang="de-AT" dirty="0" smtClean="0"/>
+          </a:p>
+          <a:p>
+            <a:endParaRPr lang="en-US" dirty="0" smtClean="0"/>
+          </a:p>
+          <a:p>
+            <a:r>
+              <a:rPr lang="en-US" dirty="0" smtClean="0"/>
+              <a:t>Vendor specific </a:t>
+            </a:r>
+            <a:r>
+              <a:rPr lang="en-US" dirty="0" smtClean="0"/>
+              <a:t>settings of a </a:t>
             </a:r>
             <a:r>
               <a:rPr lang="en-US" b="1" dirty="0" smtClean="0"/>
-              <a:t>Principal</a:t>
-            </a:r>
-            <a:r>
-              <a:rPr lang="en-US" dirty="0" smtClean="0"/>
-              <a:t> is a </a:t>
-            </a:r>
-            <a:r>
-              <a:rPr lang="en-US" b="1" dirty="0" smtClean="0"/>
-              <a:t>identity</a:t>
-            </a:r>
-            <a:r>
-              <a:rPr lang="en-US" dirty="0" smtClean="0"/>
-              <a:t> that can be authenticated.</a:t>
-            </a:r>
-          </a:p>
-          <a:p>
-            <a:pPr lvl="1"/>
-            <a:r>
-              <a:rPr lang="en-US" dirty="0"/>
-              <a:t>E.g. a Unique Username</a:t>
-            </a:r>
-          </a:p>
-          <a:p>
-            <a:r>
-              <a:rPr lang="en-US" dirty="0" smtClean="0"/>
-              <a:t>A </a:t>
-            </a:r>
-            <a:r>
-              <a:rPr lang="en-US" b="1" dirty="0" smtClean="0"/>
-              <a:t>Credential</a:t>
-            </a:r>
-            <a:r>
-              <a:rPr lang="en-US" dirty="0" smtClean="0"/>
-              <a:t> is defined as information that is used to authenticate a Principal.</a:t>
-            </a:r>
-          </a:p>
-          <a:p>
-            <a:pPr lvl="1"/>
-            <a:r>
-              <a:rPr lang="en-US" dirty="0" smtClean="0"/>
-              <a:t>E.g. a Password</a:t>
-            </a:r>
-            <a:endParaRPr lang="en-US" dirty="0"/>
+              <a:t>container</a:t>
+            </a:r>
+            <a:endParaRPr lang="en-US" b="1" dirty="0"/>
           </a:p>
         </p:txBody>
       </p:sp>
@@ -12791,7 +12749,7 @@
           <a:bodyPr/>
           <a:lstStyle/>
           <a:p>
-            <a:fld id="{3E712E1E-3397-4287-BDE5-9421B50999BE}" type="datetime1">
+            <a:fld id="{13E9B43B-4503-4062-9B5D-FB31BFAFE538}" type="datetime1">
               <a:rPr lang="de-AT" smtClean="0"/>
               <a:t>13.02.2015</a:t>
             </a:fld>
@@ -12848,7 +12806,7 @@
     </p:spTree>
     <p:extLst>
       <p:ext uri="{BB962C8B-B14F-4D97-AF65-F5344CB8AC3E}">
-        <p14:creationId xmlns:p14="http://schemas.microsoft.com/office/powerpoint/2010/main" val="401356391"/>
+        <p14:creationId xmlns:p14="http://schemas.microsoft.com/office/powerpoint/2010/main" val="1582227091"/>
       </p:ext>
     </p:extLst>
   </p:cSld>
@@ -12898,18 +12856,21 @@
           <a:lstStyle/>
           <a:p>
             <a:r>
-              <a:rPr lang="en-US" noProof="0" dirty="0" smtClean="0"/>
-              <a:t>Groups,</a:t>
-            </a:r>
-            <a:r>
-              <a:rPr lang="en-US" baseline="0" noProof="0" dirty="0" smtClean="0"/>
-              <a:t> </a:t>
-            </a:r>
-            <a:r>
-              <a:rPr lang="en-US" noProof="0" dirty="0" smtClean="0"/>
-              <a:t>Roles</a:t>
-            </a:r>
-            <a:endParaRPr lang="en-US" noProof="0" dirty="0"/>
+              <a:rPr lang="en-US" sz="3600" kern="1200" dirty="0" smtClean="0">
+                <a:solidFill>
+                  <a:schemeClr val="tx1">
+                    <a:lumMod val="85000"/>
+                    <a:lumOff val="15000"/>
+                  </a:schemeClr>
+                </a:solidFill>
+                <a:effectLst/>
+                <a:latin typeface="+mj-lt"/>
+                <a:ea typeface="+mj-ea"/>
+                <a:cs typeface="+mj-cs"/>
+              </a:rPr>
+              <a:t>Principals, Credential</a:t>
+            </a:r>
+            <a:endParaRPr lang="de-AT" dirty="0"/>
           </a:p>
         </p:txBody>
       </p:sp>
@@ -12925,89 +12886,58 @@
         </p:nvSpPr>
         <p:spPr/>
         <p:txBody>
-          <a:bodyPr>
-            <a:normAutofit/>
-          </a:bodyPr>
-          <a:lstStyle/>
-          <a:p>
-            <a:pPr lvl="0"/>
+          <a:bodyPr/>
+          <a:lstStyle/>
+          <a:p>
+            <a:r>
+              <a:rPr lang="en-US" dirty="0" smtClean="0"/>
+              <a:t>A </a:t>
+            </a:r>
             <a:r>
               <a:rPr lang="en-US" b="1" dirty="0" smtClean="0"/>
-              <a:t>Permissions</a:t>
+              <a:t>Principal</a:t>
             </a:r>
             <a:r>
               <a:rPr lang="en-US" dirty="0" smtClean="0"/>
-              <a:t> are granted to </a:t>
+              <a:t> is a </a:t>
             </a:r>
             <a:r>
               <a:rPr lang="en-US" b="1" dirty="0" smtClean="0"/>
-              <a:t>Roles</a:t>
+              <a:t>identity</a:t>
             </a:r>
             <a:r>
               <a:rPr lang="en-US" dirty="0" smtClean="0"/>
-              <a:t>.</a:t>
-            </a:r>
-          </a:p>
-          <a:p>
-            <a:pPr lvl="0"/>
-            <a:endParaRPr lang="en-US" dirty="0" smtClean="0"/>
-          </a:p>
-          <a:p>
-            <a:pPr lvl="0"/>
+              <a:t> that can be authenticated.</a:t>
+            </a:r>
+          </a:p>
+          <a:p>
+            <a:pPr lvl="1"/>
+            <a:r>
+              <a:rPr lang="en-US" dirty="0"/>
+              <a:t>E.g. a Unique Username</a:t>
+            </a:r>
+          </a:p>
+          <a:p>
+            <a:r>
+              <a:rPr lang="en-US" dirty="0" smtClean="0"/>
+              <a:t>A </a:t>
+            </a:r>
             <a:r>
               <a:rPr lang="en-US" b="1" dirty="0" smtClean="0"/>
-              <a:t>Groups</a:t>
+              <a:t>Credential</a:t>
             </a:r>
             <a:r>
               <a:rPr lang="en-US" dirty="0" smtClean="0"/>
-              <a:t> and </a:t>
-            </a:r>
-            <a:r>
-              <a:rPr lang="en-US" b="1" dirty="0"/>
-              <a:t>Principals</a:t>
-            </a:r>
-            <a:r>
-              <a:rPr lang="en-US" dirty="0"/>
-              <a:t> </a:t>
-            </a:r>
+              <a:t> is defined as information that is used to authenticate a Principal.</a:t>
+            </a:r>
+          </a:p>
+          <a:p>
+            <a:pPr lvl="1"/>
             <a:r>
               <a:rPr lang="en-US" dirty="0" smtClean="0"/>
-              <a:t>can be mapped to </a:t>
-            </a:r>
-            <a:r>
-              <a:rPr lang="en-US" b="1" dirty="0" smtClean="0"/>
-              <a:t>Roles</a:t>
-            </a:r>
-            <a:r>
-              <a:rPr lang="en-US" dirty="0" smtClean="0"/>
-              <a:t>.</a:t>
-            </a:r>
-          </a:p>
-          <a:p>
-            <a:pPr lvl="0"/>
-            <a:endParaRPr lang="en-US" dirty="0" smtClean="0"/>
-          </a:p>
-          <a:p>
-            <a:pPr lvl="0"/>
-            <a:r>
-              <a:rPr lang="en-US" b="1" dirty="0" smtClean="0"/>
-              <a:t>Roles</a:t>
-            </a:r>
-            <a:r>
-              <a:rPr lang="en-US" dirty="0" smtClean="0"/>
-              <a:t> are defined in web.xml</a:t>
-            </a:r>
-          </a:p>
-          <a:p>
-            <a:pPr lvl="0"/>
-            <a:r>
-              <a:rPr lang="en-US" b="1" dirty="0" smtClean="0"/>
-              <a:t>Groups</a:t>
-            </a:r>
-            <a:r>
-              <a:rPr lang="en-US" dirty="0" smtClean="0"/>
-              <a:t> are defined in vendor-specific.xml</a:t>
-            </a:r>
+              <a:t>E.g. a Password</a:t>
+            </a:r>
+            <a:endParaRPr lang="en-US" dirty="0"/>
           </a:p>
         </p:txBody>
       </p:sp>
@@ -13026,7 +12956,7 @@
           <a:bodyPr/>
           <a:lstStyle/>
           <a:p>
-            <a:fld id="{C771CF87-C68C-4384-93E9-D69F92989361}" type="datetime1">
+            <a:fld id="{3E712E1E-3397-4287-BDE5-9421B50999BE}" type="datetime1">
               <a:rPr lang="de-AT" smtClean="0"/>
               <a:t>13.02.2015</a:t>
             </a:fld>
@@ -13083,7 +13013,7 @@
     </p:spTree>
     <p:extLst>
       <p:ext uri="{BB962C8B-B14F-4D97-AF65-F5344CB8AC3E}">
-        <p14:creationId xmlns:p14="http://schemas.microsoft.com/office/powerpoint/2010/main" val="1822504869"/>
+        <p14:creationId xmlns:p14="http://schemas.microsoft.com/office/powerpoint/2010/main" val="401356391"/>
       </p:ext>
     </p:extLst>
   </p:cSld>
@@ -13134,7 +13064,15 @@
           <a:p>
             <a:r>
               <a:rPr lang="en-US" noProof="0" dirty="0" smtClean="0"/>
-              <a:t>Realm</a:t>
+              <a:t>Groups,</a:t>
+            </a:r>
+            <a:r>
+              <a:rPr lang="en-US" baseline="0" noProof="0" dirty="0" smtClean="0"/>
+              <a:t> </a:t>
+            </a:r>
+            <a:r>
+              <a:rPr lang="en-US" noProof="0" dirty="0" smtClean="0"/>
+              <a:t>Roles</a:t>
             </a:r>
             <a:endParaRPr lang="en-US" noProof="0" dirty="0"/>
           </a:p>
@@ -13153,79 +13091,87 @@
         <p:spPr/>
         <p:txBody>
           <a:bodyPr>
-            <a:normAutofit fontScale="92500" lnSpcReduction="10000"/>
+            <a:normAutofit/>
           </a:bodyPr>
           <a:lstStyle/>
           <a:p>
+            <a:pPr lvl="0"/>
+            <a:r>
+              <a:rPr lang="en-US" b="1" dirty="0" smtClean="0"/>
+              <a:t>Permissions</a:t>
+            </a:r>
             <a:r>
               <a:rPr lang="en-US" dirty="0" smtClean="0"/>
-              <a:t>Provides information about </a:t>
+              <a:t> are granted to </a:t>
             </a:r>
             <a:r>
               <a:rPr lang="en-US" b="1" dirty="0" smtClean="0"/>
-              <a:t>principals</a:t>
+              <a:t>Roles</a:t>
             </a:r>
             <a:r>
               <a:rPr lang="en-US" dirty="0" smtClean="0"/>
-              <a:t>, their </a:t>
-            </a:r>
+              <a:t>.</a:t>
+            </a:r>
+          </a:p>
+          <a:p>
+            <a:pPr lvl="0"/>
+            <a:endParaRPr lang="en-US" dirty="0" smtClean="0"/>
+          </a:p>
+          <a:p>
+            <a:pPr lvl="0"/>
             <a:r>
               <a:rPr lang="en-US" b="1" dirty="0" smtClean="0"/>
               <a:t>Groups</a:t>
             </a:r>
             <a:r>
               <a:rPr lang="en-US" dirty="0" smtClean="0"/>
-              <a:t> and their </a:t>
+              <a:t> and </a:t>
+            </a:r>
+            <a:r>
+              <a:rPr lang="en-US" b="1" dirty="0"/>
+              <a:t>Principals</a:t>
+            </a:r>
+            <a:r>
+              <a:rPr lang="en-US" dirty="0"/>
+              <a:t> </a:t>
+            </a:r>
+            <a:r>
+              <a:rPr lang="en-US" dirty="0" smtClean="0"/>
+              <a:t>can be mapped to </a:t>
             </a:r>
             <a:r>
               <a:rPr lang="en-US" b="1" dirty="0" smtClean="0"/>
-              <a:t>credentials</a:t>
-            </a:r>
+              <a:t>Roles</a:t>
+            </a:r>
+            <a:r>
+              <a:rPr lang="en-US" dirty="0" smtClean="0"/>
+              <a:t>.</a:t>
+            </a:r>
+          </a:p>
+          <a:p>
+            <a:pPr lvl="0"/>
             <a:endParaRPr lang="en-US" dirty="0" smtClean="0"/>
           </a:p>
           <a:p>
+            <a:pPr lvl="0"/>
+            <a:r>
+              <a:rPr lang="en-US" b="1" dirty="0" smtClean="0"/>
+              <a:t>Roles</a:t>
+            </a:r>
             <a:r>
               <a:rPr lang="en-US" dirty="0" smtClean="0"/>
-              <a:t>May be a Database, File structure, connection…</a:t>
-            </a:r>
-            <a:endParaRPr lang="en-US" dirty="0"/>
-          </a:p>
-          <a:p>
-            <a:pPr marL="0" indent="0">
-              <a:buNone/>
-            </a:pPr>
-            <a:endParaRPr lang="en-US" dirty="0"/>
-          </a:p>
-          <a:p>
-            <a:pPr marL="0" indent="0">
-              <a:buNone/>
-            </a:pPr>
-            <a:endParaRPr lang="en-US" dirty="0" smtClean="0"/>
-          </a:p>
-          <a:p>
-            <a:pPr marL="0" indent="0">
-              <a:buNone/>
-            </a:pPr>
-            <a:endParaRPr lang="en-US" dirty="0"/>
-          </a:p>
-          <a:p>
+              <a:t> are defined in web.xml</a:t>
+            </a:r>
+          </a:p>
+          <a:p>
+            <a:pPr lvl="0"/>
             <a:r>
               <a:rPr lang="en-US" b="1" dirty="0" smtClean="0"/>
-              <a:t>In other words</a:t>
-            </a:r>
-          </a:p>
-          <a:p>
-            <a:pPr lvl="1"/>
+              <a:t>Groups</a:t>
+            </a:r>
             <a:r>
               <a:rPr lang="en-US" dirty="0" smtClean="0"/>
-              <a:t>Contains User Information</a:t>
-            </a:r>
-          </a:p>
-          <a:p>
-            <a:pPr lvl="2"/>
-            <a:r>
-              <a:rPr lang="en-US" dirty="0" smtClean="0"/>
-              <a:t>E.g. Username, Password &amp; Permissions</a:t>
+              <a:t> are defined in vendor-specific.xml</a:t>
             </a:r>
           </a:p>
         </p:txBody>
@@ -13245,7 +13191,7 @@
           <a:bodyPr/>
           <a:lstStyle/>
           <a:p>
-            <a:fld id="{D864EEA2-7E20-4DE6-8072-5B7BC1217A2D}" type="datetime1">
+            <a:fld id="{C771CF87-C68C-4384-93E9-D69F92989361}" type="datetime1">
               <a:rPr lang="de-AT" smtClean="0"/>
               <a:t>13.02.2015</a:t>
             </a:fld>
@@ -13302,7 +13248,7 @@
     </p:spTree>
     <p:extLst>
       <p:ext uri="{BB962C8B-B14F-4D97-AF65-F5344CB8AC3E}">
-        <p14:creationId xmlns:p14="http://schemas.microsoft.com/office/powerpoint/2010/main" val="1226172923"/>
+        <p14:creationId xmlns:p14="http://schemas.microsoft.com/office/powerpoint/2010/main" val="1822504869"/>
       </p:ext>
     </p:extLst>
   </p:cSld>
@@ -13353,6 +13299,225 @@
           <a:p>
             <a:r>
               <a:rPr lang="en-US" noProof="0" dirty="0" smtClean="0"/>
+              <a:t>Realm</a:t>
+            </a:r>
+            <a:endParaRPr lang="en-US" noProof="0" dirty="0"/>
+          </a:p>
+        </p:txBody>
+      </p:sp>
+      <p:sp>
+        <p:nvSpPr>
+          <p:cNvPr id="3" name="Inhaltsplatzhalter 2"/>
+          <p:cNvSpPr>
+            <a:spLocks noGrp="1"/>
+          </p:cNvSpPr>
+          <p:nvPr>
+            <p:ph idx="1"/>
+          </p:nvPr>
+        </p:nvSpPr>
+        <p:spPr/>
+        <p:txBody>
+          <a:bodyPr>
+            <a:normAutofit fontScale="92500" lnSpcReduction="10000"/>
+          </a:bodyPr>
+          <a:lstStyle/>
+          <a:p>
+            <a:r>
+              <a:rPr lang="en-US" dirty="0" smtClean="0"/>
+              <a:t>Provides information about </a:t>
+            </a:r>
+            <a:r>
+              <a:rPr lang="en-US" b="1" dirty="0" smtClean="0"/>
+              <a:t>principals</a:t>
+            </a:r>
+            <a:r>
+              <a:rPr lang="en-US" dirty="0" smtClean="0"/>
+              <a:t>, their </a:t>
+            </a:r>
+            <a:r>
+              <a:rPr lang="en-US" b="1" dirty="0" smtClean="0"/>
+              <a:t>Groups</a:t>
+            </a:r>
+            <a:r>
+              <a:rPr lang="en-US" dirty="0" smtClean="0"/>
+              <a:t> and their </a:t>
+            </a:r>
+            <a:r>
+              <a:rPr lang="en-US" b="1" dirty="0" smtClean="0"/>
+              <a:t>credentials</a:t>
+            </a:r>
+            <a:endParaRPr lang="en-US" dirty="0" smtClean="0"/>
+          </a:p>
+          <a:p>
+            <a:r>
+              <a:rPr lang="en-US" dirty="0" smtClean="0"/>
+              <a:t>May be a Database, File structure, connection…</a:t>
+            </a:r>
+            <a:endParaRPr lang="en-US" dirty="0"/>
+          </a:p>
+          <a:p>
+            <a:pPr marL="0" indent="0">
+              <a:buNone/>
+            </a:pPr>
+            <a:endParaRPr lang="en-US" dirty="0"/>
+          </a:p>
+          <a:p>
+            <a:pPr marL="0" indent="0">
+              <a:buNone/>
+            </a:pPr>
+            <a:endParaRPr lang="en-US" dirty="0" smtClean="0"/>
+          </a:p>
+          <a:p>
+            <a:pPr marL="0" indent="0">
+              <a:buNone/>
+            </a:pPr>
+            <a:endParaRPr lang="en-US" dirty="0"/>
+          </a:p>
+          <a:p>
+            <a:r>
+              <a:rPr lang="en-US" b="1" dirty="0" smtClean="0"/>
+              <a:t>In other words</a:t>
+            </a:r>
+          </a:p>
+          <a:p>
+            <a:pPr lvl="1"/>
+            <a:r>
+              <a:rPr lang="en-US" dirty="0" smtClean="0"/>
+              <a:t>Contains User Information</a:t>
+            </a:r>
+          </a:p>
+          <a:p>
+            <a:pPr lvl="2"/>
+            <a:r>
+              <a:rPr lang="en-US" dirty="0" smtClean="0"/>
+              <a:t>E.g. Username, Password &amp; Permissions</a:t>
+            </a:r>
+          </a:p>
+        </p:txBody>
+      </p:sp>
+      <p:sp>
+        <p:nvSpPr>
+          <p:cNvPr id="4" name="Datumsplatzhalter 3"/>
+          <p:cNvSpPr>
+            <a:spLocks noGrp="1"/>
+          </p:cNvSpPr>
+          <p:nvPr>
+            <p:ph type="dt" sz="half" idx="10"/>
+          </p:nvPr>
+        </p:nvSpPr>
+        <p:spPr/>
+        <p:txBody>
+          <a:bodyPr/>
+          <a:lstStyle/>
+          <a:p>
+            <a:fld id="{D864EEA2-7E20-4DE6-8072-5B7BC1217A2D}" type="datetime1">
+              <a:rPr lang="de-AT" smtClean="0"/>
+              <a:t>13.02.2015</a:t>
+            </a:fld>
+            <a:endParaRPr lang="en-US" dirty="0"/>
+          </a:p>
+        </p:txBody>
+      </p:sp>
+      <p:sp>
+        <p:nvSpPr>
+          <p:cNvPr id="5" name="Fußzeilenplatzhalter 4"/>
+          <p:cNvSpPr>
+            <a:spLocks noGrp="1"/>
+          </p:cNvSpPr>
+          <p:nvPr>
+            <p:ph type="ftr" sz="quarter" idx="11"/>
+          </p:nvPr>
+        </p:nvSpPr>
+        <p:spPr/>
+        <p:txBody>
+          <a:bodyPr/>
+          <a:lstStyle/>
+          <a:p>
+            <a:r>
+              <a:rPr lang="en-US" dirty="0" smtClean="0"/>
+              <a:t>Ari Ayvazyan, Adrian Bergler, Java EE Security</a:t>
+            </a:r>
+            <a:endParaRPr lang="en-US" dirty="0"/>
+          </a:p>
+        </p:txBody>
+      </p:sp>
+      <p:sp>
+        <p:nvSpPr>
+          <p:cNvPr id="6" name="Foliennummernplatzhalter 5"/>
+          <p:cNvSpPr>
+            <a:spLocks noGrp="1"/>
+          </p:cNvSpPr>
+          <p:nvPr>
+            <p:ph type="sldNum" sz="quarter" idx="12"/>
+          </p:nvPr>
+        </p:nvSpPr>
+        <p:spPr/>
+        <p:txBody>
+          <a:bodyPr/>
+          <a:lstStyle/>
+          <a:p>
+            <a:fld id="{D57F1E4F-1CFF-5643-939E-02111984F565}" type="slidenum">
+              <a:rPr lang="en-US" smtClean="0"/>
+              <a:t>16</a:t>
+            </a:fld>
+            <a:endParaRPr lang="en-US" dirty="0"/>
+          </a:p>
+        </p:txBody>
+      </p:sp>
+    </p:spTree>
+    <p:extLst>
+      <p:ext uri="{BB962C8B-B14F-4D97-AF65-F5344CB8AC3E}">
+        <p14:creationId xmlns:p14="http://schemas.microsoft.com/office/powerpoint/2010/main" val="1226172923"/>
+      </p:ext>
+    </p:extLst>
+  </p:cSld>
+  <p:clrMapOvr>
+    <a:masterClrMapping/>
+  </p:clrMapOvr>
+  <p:timing>
+    <p:tnLst>
+      <p:par>
+        <p:cTn id="1" dur="indefinite" restart="never" nodeType="tmRoot"/>
+      </p:par>
+    </p:tnLst>
+  </p:timing>
+</p:sld>
+</file>
+
+<file path=ppt/slides/slide17.xml><?xml version="1.0" encoding="utf-8"?>
+<p:sld xmlns:a="http://schemas.openxmlformats.org/drawingml/2006/main" xmlns:r="http://schemas.openxmlformats.org/officeDocument/2006/relationships" xmlns:p="http://schemas.openxmlformats.org/presentationml/2006/main">
+  <p:cSld>
+    <p:spTree>
+      <p:nvGrpSpPr>
+        <p:cNvPr id="1" name=""/>
+        <p:cNvGrpSpPr/>
+        <p:nvPr/>
+      </p:nvGrpSpPr>
+      <p:grpSpPr>
+        <a:xfrm>
+          <a:off x="0" y="0"/>
+          <a:ext cx="0" cy="0"/>
+          <a:chOff x="0" y="0"/>
+          <a:chExt cx="0" cy="0"/>
+        </a:xfrm>
+      </p:grpSpPr>
+      <p:sp>
+        <p:nvSpPr>
+          <p:cNvPr id="2" name="Titel 1"/>
+          <p:cNvSpPr>
+            <a:spLocks noGrp="1"/>
+          </p:cNvSpPr>
+          <p:nvPr>
+            <p:ph type="title"/>
+          </p:nvPr>
+        </p:nvSpPr>
+        <p:spPr/>
+        <p:txBody>
+          <a:bodyPr/>
+          <a:lstStyle/>
+          <a:p>
+            <a:r>
+              <a:rPr lang="en-US" noProof="0" dirty="0" smtClean="0"/>
               <a:t>Live example </a:t>
             </a:r>
             <a:r>
@@ -13463,7 +13628,7 @@
           <a:p>
             <a:fld id="{D57F1E4F-1CFF-5643-939E-02111984F565}" type="slidenum">
               <a:rPr lang="en-US" smtClean="0"/>
-              <a:t>16</a:t>
+              <a:t>17</a:t>
             </a:fld>
             <a:endParaRPr lang="en-US" dirty="0"/>
           </a:p>
@@ -13816,7 +13981,7 @@
 </p:sld>
 </file>
 
-<file path=ppt/slides/slide17.xml><?xml version="1.0" encoding="utf-8"?>
+<file path=ppt/slides/slide18.xml><?xml version="1.0" encoding="utf-8"?>
 <p:sld xmlns:a="http://schemas.openxmlformats.org/drawingml/2006/main" xmlns:r="http://schemas.openxmlformats.org/officeDocument/2006/relationships" xmlns:p="http://schemas.openxmlformats.org/presentationml/2006/main">
   <p:cSld>
     <p:spTree>
@@ -13919,7 +14084,7 @@
           <a:p>
             <a:fld id="{D57F1E4F-1CFF-5643-939E-02111984F565}" type="slidenum">
               <a:rPr lang="en-US" smtClean="0"/>
-              <a:t>17</a:t>
+              <a:t>18</a:t>
             </a:fld>
             <a:endParaRPr lang="en-US" dirty="0"/>
           </a:p>
@@ -14301,223 +14466,6 @@
 </p:sld>
 </file>
 
-<file path=ppt/slides/slide18.xml><?xml version="1.0" encoding="utf-8"?>
-<p:sld xmlns:a="http://schemas.openxmlformats.org/drawingml/2006/main" xmlns:r="http://schemas.openxmlformats.org/officeDocument/2006/relationships" xmlns:p="http://schemas.openxmlformats.org/presentationml/2006/main">
-  <p:cSld>
-    <p:spTree>
-      <p:nvGrpSpPr>
-        <p:cNvPr id="1" name=""/>
-        <p:cNvGrpSpPr/>
-        <p:nvPr/>
-      </p:nvGrpSpPr>
-      <p:grpSpPr>
-        <a:xfrm>
-          <a:off x="0" y="0"/>
-          <a:ext cx="0" cy="0"/>
-          <a:chOff x="0" y="0"/>
-          <a:chExt cx="0" cy="0"/>
-        </a:xfrm>
-      </p:grpSpPr>
-      <p:sp>
-        <p:nvSpPr>
-          <p:cNvPr id="2" name="Titel 1"/>
-          <p:cNvSpPr>
-            <a:spLocks noGrp="1"/>
-          </p:cNvSpPr>
-          <p:nvPr>
-            <p:ph type="title"/>
-          </p:nvPr>
-        </p:nvSpPr>
-        <p:spPr/>
-        <p:txBody>
-          <a:bodyPr>
-            <a:normAutofit/>
-          </a:bodyPr>
-          <a:lstStyle/>
-          <a:p>
-            <a:pPr rtl="0" eaLnBrk="1" latinLnBrk="0" hangingPunct="1"/>
-            <a:r>
-              <a:rPr lang="en-US" sz="3600" kern="1200" dirty="0" smtClean="0">
-                <a:solidFill>
-                  <a:schemeClr val="tx1">
-                    <a:lumMod val="85000"/>
-                    <a:lumOff val="15000"/>
-                  </a:schemeClr>
-                </a:solidFill>
-                <a:effectLst/>
-              </a:rPr>
-              <a:t>Live example</a:t>
-            </a:r>
-            <a:endParaRPr lang="de-AT" sz="3600" dirty="0" smtClean="0">
-              <a:effectLst/>
-            </a:endParaRPr>
-          </a:p>
-        </p:txBody>
-      </p:sp>
-      <p:sp>
-        <p:nvSpPr>
-          <p:cNvPr id="4" name="Datumsplatzhalter 3"/>
-          <p:cNvSpPr>
-            <a:spLocks noGrp="1"/>
-          </p:cNvSpPr>
-          <p:nvPr>
-            <p:ph type="dt" sz="half" idx="10"/>
-          </p:nvPr>
-        </p:nvSpPr>
-        <p:spPr/>
-        <p:txBody>
-          <a:bodyPr/>
-          <a:lstStyle/>
-          <a:p>
-            <a:fld id="{65CAD967-9D5C-4FE7-B558-253609022E15}" type="datetime1">
-              <a:rPr lang="de-AT" smtClean="0"/>
-              <a:t>13.02.2015</a:t>
-            </a:fld>
-            <a:endParaRPr lang="en-US" dirty="0"/>
-          </a:p>
-        </p:txBody>
-      </p:sp>
-      <p:sp>
-        <p:nvSpPr>
-          <p:cNvPr id="5" name="Fußzeilenplatzhalter 4"/>
-          <p:cNvSpPr>
-            <a:spLocks noGrp="1"/>
-          </p:cNvSpPr>
-          <p:nvPr>
-            <p:ph type="ftr" sz="quarter" idx="11"/>
-          </p:nvPr>
-        </p:nvSpPr>
-        <p:spPr/>
-        <p:txBody>
-          <a:bodyPr/>
-          <a:lstStyle/>
-          <a:p>
-            <a:r>
-              <a:rPr lang="en-US" dirty="0" smtClean="0"/>
-              <a:t>Ari Ayvazyan, Adrian Bergler, Java EE Security</a:t>
-            </a:r>
-            <a:endParaRPr lang="en-US" dirty="0"/>
-          </a:p>
-        </p:txBody>
-      </p:sp>
-      <p:sp>
-        <p:nvSpPr>
-          <p:cNvPr id="6" name="Foliennummernplatzhalter 5"/>
-          <p:cNvSpPr>
-            <a:spLocks noGrp="1"/>
-          </p:cNvSpPr>
-          <p:nvPr>
-            <p:ph type="sldNum" sz="quarter" idx="12"/>
-          </p:nvPr>
-        </p:nvSpPr>
-        <p:spPr/>
-        <p:txBody>
-          <a:bodyPr/>
-          <a:lstStyle/>
-          <a:p>
-            <a:fld id="{D57F1E4F-1CFF-5643-939E-02111984F565}" type="slidenum">
-              <a:rPr lang="en-US" smtClean="0"/>
-              <a:t>18</a:t>
-            </a:fld>
-            <a:endParaRPr lang="en-US" dirty="0"/>
-          </a:p>
-        </p:txBody>
-      </p:sp>
-      <p:sp>
-        <p:nvSpPr>
-          <p:cNvPr id="10" name="Inhaltsplatzhalter 9"/>
-          <p:cNvSpPr>
-            <a:spLocks noGrp="1"/>
-          </p:cNvSpPr>
-          <p:nvPr>
-            <p:ph idx="1"/>
-          </p:nvPr>
-        </p:nvSpPr>
-        <p:spPr>
-          <a:xfrm>
-            <a:off x="741680" y="2133600"/>
-            <a:ext cx="10762932" cy="3777622"/>
-          </a:xfrm>
-        </p:spPr>
-        <p:txBody>
-          <a:bodyPr>
-            <a:normAutofit/>
-          </a:bodyPr>
-          <a:lstStyle/>
-          <a:p>
-            <a:pPr marL="0" indent="0">
-              <a:buNone/>
-            </a:pPr>
-            <a:r>
-              <a:rPr lang="de-AT" sz="2800" b="1" dirty="0" smtClean="0"/>
-              <a:t>https://github.com/</a:t>
-            </a:r>
-            <a:r>
-              <a:rPr lang="de-AT" sz="2800" b="1" dirty="0" smtClean="0">
-                <a:solidFill>
-                  <a:schemeClr val="accent1">
-                    <a:lumMod val="60000"/>
-                    <a:lumOff val="40000"/>
-                  </a:schemeClr>
-                </a:solidFill>
-              </a:rPr>
-              <a:t>aayvazyan-tgm</a:t>
-            </a:r>
-            <a:r>
-              <a:rPr lang="de-AT" sz="2800" b="1" dirty="0" smtClean="0">
-                <a:solidFill>
-                  <a:schemeClr val="tx1"/>
-                </a:solidFill>
-              </a:rPr>
-              <a:t>/</a:t>
-            </a:r>
-            <a:r>
-              <a:rPr lang="de-AT" sz="2800" b="1" dirty="0" smtClean="0">
-                <a:solidFill>
-                  <a:schemeClr val="accent1">
-                    <a:lumMod val="60000"/>
-                    <a:lumOff val="40000"/>
-                  </a:schemeClr>
-                </a:solidFill>
-              </a:rPr>
-              <a:t>JavaEESecurityExample</a:t>
-            </a:r>
-          </a:p>
-          <a:p>
-            <a:pPr marL="0" indent="0">
-              <a:buNone/>
-            </a:pPr>
-            <a:endParaRPr lang="de-AT" sz="2800" b="1" dirty="0">
-              <a:solidFill>
-                <a:schemeClr val="accent1">
-                  <a:lumMod val="60000"/>
-                  <a:lumOff val="40000"/>
-                </a:schemeClr>
-              </a:solidFill>
-            </a:endParaRPr>
-          </a:p>
-        </p:txBody>
-      </p:sp>
-    </p:spTree>
-    <p:extLst>
-      <p:ext uri="{BB962C8B-B14F-4D97-AF65-F5344CB8AC3E}">
-        <p14:creationId xmlns:p14="http://schemas.microsoft.com/office/powerpoint/2010/main" val="4283007290"/>
-      </p:ext>
-    </p:extLst>
-  </p:cSld>
-  <p:clrMapOvr>
-    <a:masterClrMapping/>
-  </p:clrMapOvr>
-  <p:timing>
-    <p:tnLst>
-      <p:par>
-        <p:cTn id="1" dur="indefinite" restart="never" nodeType="tmRoot"/>
-      </p:par>
-    </p:tnLst>
-  </p:timing>
-</p:sld>
-</file>
-
 <file path=ppt/slides/slide19.xml><?xml version="1.0" encoding="utf-8"?>
 <p:sld xmlns:a="http://schemas.openxmlformats.org/drawingml/2006/main" xmlns:r="http://schemas.openxmlformats.org/officeDocument/2006/relationships" xmlns:p="http://schemas.openxmlformats.org/presentationml/2006/main">
   <p:cSld>
@@ -14537,7 +14485,7 @@
       </p:grpSpPr>
       <p:sp>
         <p:nvSpPr>
-          <p:cNvPr id="2" name="Title 1"/>
+          <p:cNvPr id="2" name="Titel 1"/>
           <p:cNvSpPr>
             <a:spLocks noGrp="1"/>
           </p:cNvSpPr>
@@ -14547,39 +14495,33 @@
         </p:nvSpPr>
         <p:spPr/>
         <p:txBody>
-          <a:bodyPr/>
-          <a:lstStyle/>
-          <a:p>
-            <a:r>
-              <a:rPr lang="de-AT" dirty="0" smtClean="0"/>
-              <a:t>EJB Slides</a:t>
-            </a:r>
-            <a:endParaRPr lang="de-AT" dirty="0"/>
-          </a:p>
-        </p:txBody>
-      </p:sp>
-      <p:sp>
-        <p:nvSpPr>
-          <p:cNvPr id="3" name="Content Placeholder 2"/>
-          <p:cNvSpPr>
-            <a:spLocks noGrp="1"/>
-          </p:cNvSpPr>
-          <p:nvPr>
-            <p:ph idx="1"/>
-          </p:nvPr>
-        </p:nvSpPr>
-        <p:spPr/>
-        <p:txBody>
-          <a:bodyPr/>
-          <a:lstStyle/>
-          <a:p>
-            <a:endParaRPr lang="de-AT"/>
-          </a:p>
-        </p:txBody>
-      </p:sp>
-      <p:sp>
-        <p:nvSpPr>
-          <p:cNvPr id="4" name="Date Placeholder 3"/>
+          <a:bodyPr>
+            <a:normAutofit/>
+          </a:bodyPr>
+          <a:lstStyle/>
+          <a:p>
+            <a:pPr rtl="0" eaLnBrk="1" latinLnBrk="0" hangingPunct="1"/>
+            <a:r>
+              <a:rPr lang="en-US" sz="3600" kern="1200" dirty="0" smtClean="0">
+                <a:solidFill>
+                  <a:schemeClr val="tx1">
+                    <a:lumMod val="85000"/>
+                    <a:lumOff val="15000"/>
+                  </a:schemeClr>
+                </a:solidFill>
+                <a:effectLst/>
+              </a:rPr>
+              <a:t>Live example</a:t>
+            </a:r>
+            <a:endParaRPr lang="de-AT" sz="3600" dirty="0" smtClean="0">
+              <a:effectLst/>
+            </a:endParaRPr>
+          </a:p>
+        </p:txBody>
+      </p:sp>
+      <p:sp>
+        <p:nvSpPr>
+          <p:cNvPr id="4" name="Datumsplatzhalter 3"/>
           <p:cNvSpPr>
             <a:spLocks noGrp="1"/>
           </p:cNvSpPr>
@@ -14592,7 +14534,7 @@
           <a:bodyPr/>
           <a:lstStyle/>
           <a:p>
-            <a:fld id="{4A970268-AA4D-4BC5-A34A-E9BE3AB96B6A}" type="datetime1">
+            <a:fld id="{65CAD967-9D5C-4FE7-B558-253609022E15}" type="datetime1">
               <a:rPr lang="de-AT" smtClean="0"/>
               <a:t>13.02.2015</a:t>
             </a:fld>
@@ -14602,7 +14544,7 @@
       </p:sp>
       <p:sp>
         <p:nvSpPr>
-          <p:cNvPr id="5" name="Footer Placeholder 4"/>
+          <p:cNvPr id="5" name="Fußzeilenplatzhalter 4"/>
           <p:cNvSpPr>
             <a:spLocks noGrp="1"/>
           </p:cNvSpPr>
@@ -14625,7 +14567,7 @@
       </p:sp>
       <p:sp>
         <p:nvSpPr>
-          <p:cNvPr id="6" name="Slide Number Placeholder 5"/>
+          <p:cNvPr id="6" name="Foliennummernplatzhalter 5"/>
           <p:cNvSpPr>
             <a:spLocks noGrp="1"/>
           </p:cNvSpPr>
@@ -14646,10 +14588,85 @@
           </a:p>
         </p:txBody>
       </p:sp>
+      <p:sp>
+        <p:nvSpPr>
+          <p:cNvPr id="10" name="Inhaltsplatzhalter 9"/>
+          <p:cNvSpPr>
+            <a:spLocks noGrp="1"/>
+          </p:cNvSpPr>
+          <p:nvPr>
+            <p:ph idx="1"/>
+          </p:nvPr>
+        </p:nvSpPr>
+        <p:spPr>
+          <a:xfrm>
+            <a:off x="741680" y="2133600"/>
+            <a:ext cx="10762932" cy="3777622"/>
+          </a:xfrm>
+        </p:spPr>
+        <p:txBody>
+          <a:bodyPr>
+            <a:normAutofit/>
+          </a:bodyPr>
+          <a:lstStyle/>
+          <a:p>
+            <a:pPr marL="0" indent="0">
+              <a:buNone/>
+            </a:pPr>
+            <a:r>
+              <a:rPr lang="de-AT" sz="2800" b="1" dirty="0" smtClean="0"/>
+              <a:t>https://github.com/</a:t>
+            </a:r>
+            <a:r>
+              <a:rPr lang="de-AT" sz="2800" b="1" dirty="0" smtClean="0">
+                <a:solidFill>
+                  <a:schemeClr val="accent1">
+                    <a:lumMod val="60000"/>
+                    <a:lumOff val="40000"/>
+                  </a:schemeClr>
+                </a:solidFill>
+              </a:rPr>
+              <a:t>aayvazyan-tgm</a:t>
+            </a:r>
+            <a:r>
+              <a:rPr lang="de-AT" sz="2800" b="1" dirty="0" smtClean="0">
+                <a:solidFill>
+                  <a:schemeClr val="tx1"/>
+                </a:solidFill>
+              </a:rPr>
+              <a:t>/</a:t>
+            </a:r>
+            <a:r>
+              <a:rPr lang="de-AT" sz="2800" b="1" dirty="0" smtClean="0">
+                <a:solidFill>
+                  <a:schemeClr val="accent1">
+                    <a:lumMod val="60000"/>
+                    <a:lumOff val="40000"/>
+                  </a:schemeClr>
+                </a:solidFill>
+              </a:rPr>
+              <a:t>JavaEESecurityExample</a:t>
+            </a:r>
+          </a:p>
+          <a:p>
+            <a:pPr marL="0" indent="0">
+              <a:buNone/>
+            </a:pPr>
+            <a:endParaRPr lang="de-AT" sz="2800" b="1" dirty="0">
+              <a:solidFill>
+                <a:schemeClr val="accent1">
+                  <a:lumMod val="60000"/>
+                  <a:lumOff val="40000"/>
+                </a:schemeClr>
+              </a:solidFill>
+            </a:endParaRPr>
+          </a:p>
+        </p:txBody>
+      </p:sp>
     </p:spTree>
     <p:extLst>
       <p:ext uri="{BB962C8B-B14F-4D97-AF65-F5344CB8AC3E}">
-        <p14:creationId xmlns:p14="http://schemas.microsoft.com/office/powerpoint/2010/main" val="1996932945"/>
+        <p14:creationId xmlns:p14="http://schemas.microsoft.com/office/powerpoint/2010/main" val="4283007290"/>
       </p:ext>
     </p:extLst>
   </p:cSld>
@@ -14913,7 +14930,7 @@
           <a:p>
             <a:r>
               <a:rPr lang="de-AT" dirty="0" smtClean="0"/>
-              <a:t>Application Client Slides</a:t>
+              <a:t>EJB Slides</a:t>
             </a:r>
             <a:endParaRPr lang="de-AT" dirty="0"/>
           </a:p>
@@ -14953,7 +14970,7 @@
           <a:bodyPr/>
           <a:lstStyle/>
           <a:p>
-            <a:fld id="{B513651D-7A83-4608-A243-C4C141292260}" type="datetime1">
+            <a:fld id="{4A970268-AA4D-4BC5-A34A-E9BE3AB96B6A}" type="datetime1">
               <a:rPr lang="de-AT" smtClean="0"/>
               <a:t>13.02.2015</a:t>
             </a:fld>
@@ -15010,7 +15027,7 @@
     </p:spTree>
     <p:extLst>
       <p:ext uri="{BB962C8B-B14F-4D97-AF65-F5344CB8AC3E}">
-        <p14:creationId xmlns:p14="http://schemas.microsoft.com/office/powerpoint/2010/main" val="3692171424"/>
+        <p14:creationId xmlns:p14="http://schemas.microsoft.com/office/powerpoint/2010/main" val="1996932945"/>
       </p:ext>
     </p:extLst>
   </p:cSld>
@@ -15060,34 +15077,34 @@
           <a:lstStyle/>
           <a:p>
             <a:r>
-              <a:rPr lang="de-AT" smtClean="0"/>
-              <a:t>Digital Certificates Slides</a:t>
-            </a:r>
+              <a:rPr lang="de-AT" dirty="0" smtClean="0"/>
+              <a:t>Application Client Slides</a:t>
+            </a:r>
+            <a:endParaRPr lang="de-AT" dirty="0"/>
+          </a:p>
+        </p:txBody>
+      </p:sp>
+      <p:sp>
+        <p:nvSpPr>
+          <p:cNvPr id="3" name="Content Placeholder 2"/>
+          <p:cNvSpPr>
+            <a:spLocks noGrp="1"/>
+          </p:cNvSpPr>
+          <p:nvPr>
+            <p:ph idx="1"/>
+          </p:nvPr>
+        </p:nvSpPr>
+        <p:spPr/>
+        <p:txBody>
+          <a:bodyPr/>
+          <a:lstStyle/>
+          <a:p>
             <a:endParaRPr lang="de-AT"/>
           </a:p>
         </p:txBody>
       </p:sp>
       <p:sp>
         <p:nvSpPr>
-          <p:cNvPr id="3" name="Content Placeholder 2"/>
-          <p:cNvSpPr>
-            <a:spLocks noGrp="1"/>
-          </p:cNvSpPr>
-          <p:nvPr>
-            <p:ph idx="1"/>
-          </p:nvPr>
-        </p:nvSpPr>
-        <p:spPr/>
-        <p:txBody>
-          <a:bodyPr/>
-          <a:lstStyle/>
-          <a:p>
-            <a:endParaRPr lang="de-AT"/>
-          </a:p>
-        </p:txBody>
-      </p:sp>
-      <p:sp>
-        <p:nvSpPr>
           <p:cNvPr id="4" name="Date Placeholder 3"/>
           <p:cNvSpPr>
             <a:spLocks noGrp="1"/>
@@ -15101,7 +15118,7 @@
           <a:bodyPr/>
           <a:lstStyle/>
           <a:p>
-            <a:fld id="{5E747D12-5EA7-4906-81DF-D3F9CA3728BA}" type="datetime1">
+            <a:fld id="{B513651D-7A83-4608-A243-C4C141292260}" type="datetime1">
               <a:rPr lang="de-AT" smtClean="0"/>
               <a:t>13.02.2015</a:t>
             </a:fld>
@@ -15158,7 +15175,7 @@
     </p:spTree>
     <p:extLst>
       <p:ext uri="{BB962C8B-B14F-4D97-AF65-F5344CB8AC3E}">
-        <p14:creationId xmlns:p14="http://schemas.microsoft.com/office/powerpoint/2010/main" val="1927524683"/>
+        <p14:creationId xmlns:p14="http://schemas.microsoft.com/office/powerpoint/2010/main" val="3692171424"/>
       </p:ext>
     </p:extLst>
   </p:cSld>
@@ -15194,7 +15211,7 @@
       </p:grpSpPr>
       <p:sp>
         <p:nvSpPr>
-          <p:cNvPr id="2" name="Titel 1"/>
+          <p:cNvPr id="2" name="Title 1"/>
           <p:cNvSpPr>
             <a:spLocks noGrp="1"/>
           </p:cNvSpPr>
@@ -15207,31 +15224,17 @@
           <a:bodyPr/>
           <a:lstStyle/>
           <a:p>
-            <a:pPr rtl="0" eaLnBrk="1" latinLnBrk="0" hangingPunct="1"/>
-            <a:r>
-              <a:rPr lang="en-US" sz="3600" kern="1200" dirty="0" smtClean="0">
-                <a:solidFill>
-                  <a:schemeClr val="tx1">
-                    <a:lumMod val="85000"/>
-                    <a:lumOff val="15000"/>
-                  </a:schemeClr>
-                </a:solidFill>
-                <a:effectLst/>
-                <a:latin typeface="+mj-lt"/>
-                <a:ea typeface="+mj-ea"/>
-                <a:cs typeface="+mj-cs"/>
-              </a:rPr>
-              <a:t>Frameworks</a:t>
-            </a:r>
-            <a:endParaRPr lang="de-AT" dirty="0" smtClean="0">
-              <a:effectLst/>
-            </a:endParaRPr>
-          </a:p>
-        </p:txBody>
-      </p:sp>
-      <p:sp>
-        <p:nvSpPr>
-          <p:cNvPr id="3" name="Inhaltsplatzhalter 2"/>
+            <a:r>
+              <a:rPr lang="de-AT" smtClean="0"/>
+              <a:t>Digital Certificates Slides</a:t>
+            </a:r>
+            <a:endParaRPr lang="de-AT"/>
+          </a:p>
+        </p:txBody>
+      </p:sp>
+      <p:sp>
+        <p:nvSpPr>
+          <p:cNvPr id="3" name="Content Placeholder 2"/>
           <p:cNvSpPr>
             <a:spLocks noGrp="1"/>
           </p:cNvSpPr>
@@ -15241,103 +15244,16 @@
         </p:nvSpPr>
         <p:spPr/>
         <p:txBody>
-          <a:bodyPr>
-            <a:normAutofit lnSpcReduction="10000"/>
-          </a:bodyPr>
-          <a:lstStyle/>
-          <a:p>
-            <a:r>
-              <a:rPr lang="en-US" dirty="0" smtClean="0"/>
-              <a:t>Apache Shiro</a:t>
-            </a:r>
-          </a:p>
-          <a:p>
-            <a:pPr lvl="1"/>
-            <a:r>
-              <a:rPr lang="en-US" dirty="0" smtClean="0"/>
-              <a:t>Authentication, Authorization, Cryptography</a:t>
-            </a:r>
-          </a:p>
-          <a:p>
-            <a:pPr lvl="1"/>
-            <a:r>
-              <a:rPr lang="en-US" dirty="0" smtClean="0"/>
-              <a:t>Simple Code Structure</a:t>
-            </a:r>
-          </a:p>
-          <a:p>
-            <a:r>
-              <a:rPr lang="en-US" dirty="0" smtClean="0"/>
-              <a:t>Spring Security</a:t>
-            </a:r>
-          </a:p>
-          <a:p>
-            <a:pPr lvl="1"/>
-            <a:r>
-              <a:rPr lang="en-US" dirty="0" smtClean="0"/>
-              <a:t>Authentication, Authorization, Cryptography</a:t>
-            </a:r>
-          </a:p>
-          <a:p>
-            <a:pPr lvl="1"/>
-            <a:r>
-              <a:rPr lang="en-US" dirty="0" smtClean="0"/>
-              <a:t>Very structured</a:t>
-            </a:r>
-          </a:p>
-          <a:p>
-            <a:r>
-              <a:rPr lang="en-US" dirty="0"/>
-              <a:t>JAAS </a:t>
-            </a:r>
-            <a:r>
-              <a:rPr lang="en-US" dirty="0" smtClean="0"/>
-              <a:t>- Java </a:t>
-            </a:r>
-            <a:r>
-              <a:rPr lang="en-US" dirty="0"/>
-              <a:t>Authentication and Authorization </a:t>
-            </a:r>
-            <a:r>
-              <a:rPr lang="en-US" dirty="0" smtClean="0"/>
-              <a:t>Service</a:t>
-            </a:r>
-          </a:p>
-          <a:p>
-            <a:pPr lvl="1"/>
-            <a:r>
-              <a:rPr lang="en-US" dirty="0" smtClean="0"/>
-              <a:t>Authentication</a:t>
-            </a:r>
-            <a:r>
-              <a:rPr lang="en-US" dirty="0"/>
-              <a:t>, </a:t>
-            </a:r>
-            <a:r>
-              <a:rPr lang="en-US" dirty="0" smtClean="0"/>
-              <a:t>Authorization, Cryptography</a:t>
-            </a:r>
-          </a:p>
-          <a:p>
-            <a:pPr lvl="1"/>
-            <a:r>
-              <a:rPr lang="en-US" dirty="0" smtClean="0"/>
-              <a:t>Included in Java SE since Java 1.4 (</a:t>
-            </a:r>
-            <a:r>
-              <a:rPr lang="de-AT" dirty="0" err="1" smtClean="0"/>
-              <a:t>javax.security.auth</a:t>
-            </a:r>
-            <a:r>
-              <a:rPr lang="de-AT" dirty="0" smtClean="0"/>
-              <a:t>)</a:t>
-            </a:r>
-          </a:p>
-        </p:txBody>
-      </p:sp>
-      <p:sp>
-        <p:nvSpPr>
-          <p:cNvPr id="4" name="Datumsplatzhalter 3"/>
+          <a:bodyPr/>
+          <a:lstStyle/>
+          <a:p>
+            <a:endParaRPr lang="de-AT"/>
+          </a:p>
+        </p:txBody>
+      </p:sp>
+      <p:sp>
+        <p:nvSpPr>
+          <p:cNvPr id="4" name="Date Placeholder 3"/>
           <p:cNvSpPr>
             <a:spLocks noGrp="1"/>
           </p:cNvSpPr>
@@ -15350,7 +15266,7 @@
           <a:bodyPr/>
           <a:lstStyle/>
           <a:p>
-            <a:fld id="{3F4C572F-BCA4-4487-8EBD-15EE8D7320C7}" type="datetime1">
+            <a:fld id="{5E747D12-5EA7-4906-81DF-D3F9CA3728BA}" type="datetime1">
               <a:rPr lang="de-AT" smtClean="0"/>
               <a:t>13.02.2015</a:t>
             </a:fld>
@@ -15360,7 +15276,7 @@
       </p:sp>
       <p:sp>
         <p:nvSpPr>
-          <p:cNvPr id="5" name="Fußzeilenplatzhalter 4"/>
+          <p:cNvPr id="5" name="Footer Placeholder 4"/>
           <p:cNvSpPr>
             <a:spLocks noGrp="1"/>
           </p:cNvSpPr>
@@ -15383,7 +15299,7 @@
       </p:sp>
       <p:sp>
         <p:nvSpPr>
-          <p:cNvPr id="6" name="Foliennummernplatzhalter 5"/>
+          <p:cNvPr id="6" name="Slide Number Placeholder 5"/>
           <p:cNvSpPr>
             <a:spLocks noGrp="1"/>
           </p:cNvSpPr>
@@ -15407,7 +15323,7 @@
     </p:spTree>
     <p:extLst>
       <p:ext uri="{BB962C8B-B14F-4D97-AF65-F5344CB8AC3E}">
-        <p14:creationId xmlns:p14="http://schemas.microsoft.com/office/powerpoint/2010/main" val="260349493"/>
+        <p14:creationId xmlns:p14="http://schemas.microsoft.com/office/powerpoint/2010/main" val="1927524683"/>
       </p:ext>
     </p:extLst>
   </p:cSld>
@@ -15456,6 +15372,7 @@
           <a:bodyPr/>
           <a:lstStyle/>
           <a:p>
+            <a:pPr rtl="0" eaLnBrk="1" latinLnBrk="0" hangingPunct="1"/>
             <a:r>
               <a:rPr lang="en-US" sz="3600" kern="1200" dirty="0" smtClean="0">
                 <a:solidFill>
@@ -15469,9 +15386,11 @@
                 <a:ea typeface="+mj-ea"/>
                 <a:cs typeface="+mj-cs"/>
               </a:rPr>
-              <a:t>Output escaping</a:t>
-            </a:r>
-            <a:endParaRPr lang="de-AT" dirty="0"/>
+              <a:t>Frameworks … - Advantages</a:t>
+            </a:r>
+            <a:endParaRPr lang="de-AT" dirty="0" smtClean="0">
+              <a:effectLst/>
+            </a:endParaRPr>
           </a:p>
         </p:txBody>
       </p:sp>
@@ -15487,46 +15406,42 @@
         </p:nvSpPr>
         <p:spPr/>
         <p:txBody>
-          <a:bodyPr/>
+          <a:bodyPr>
+            <a:normAutofit/>
+          </a:bodyPr>
           <a:lstStyle/>
           <a:p>
             <a:r>
               <a:rPr lang="en-US" dirty="0" smtClean="0"/>
-              <a:t>Escape user input</a:t>
-            </a:r>
-          </a:p>
-          <a:p>
-            <a:pPr lvl="1"/>
+              <a:t>are tested</a:t>
+            </a:r>
+          </a:p>
+          <a:p>
             <a:r>
               <a:rPr lang="en-US" dirty="0" smtClean="0"/>
-              <a:t>To prevent injections</a:t>
-            </a:r>
-          </a:p>
-          <a:p>
+              <a:t>are more secure due to public testing</a:t>
+            </a:r>
             <a:endParaRPr lang="en-US" dirty="0" smtClean="0"/>
           </a:p>
           <a:p>
             <a:r>
               <a:rPr lang="en-US" dirty="0" smtClean="0"/>
-              <a:t>Escape the output</a:t>
-            </a:r>
-          </a:p>
-          <a:p>
-            <a:pPr lvl="1"/>
+              <a:t>are supported</a:t>
+            </a:r>
+          </a:p>
+          <a:p>
+            <a:r>
+              <a:rPr lang="en-US" dirty="0"/>
+              <a:t>c</a:t>
+            </a:r>
             <a:r>
               <a:rPr lang="en-US" dirty="0" smtClean="0"/>
-              <a:t>To add an extra layer of security (for the user)</a:t>
-            </a:r>
-          </a:p>
-          <a:p>
-            <a:endParaRPr lang="en-US" dirty="0"/>
-          </a:p>
-          <a:p>
+              <a:t>an save time </a:t>
+            </a:r>
             <a:r>
               <a:rPr lang="en-US" dirty="0" smtClean="0"/>
-              <a:t>Use a Framework!</a:t>
-            </a:r>
-            <a:endParaRPr lang="en-US" dirty="0"/>
+              <a:t>on long term</a:t>
+            </a:r>
           </a:p>
         </p:txBody>
       </p:sp>
@@ -15545,7 +15460,7 @@
           <a:bodyPr/>
           <a:lstStyle/>
           <a:p>
-            <a:fld id="{73F9A2D8-44B8-467F-9223-0D7436D41992}" type="datetime1">
+            <a:fld id="{3F4C572F-BCA4-4487-8EBD-15EE8D7320C7}" type="datetime1">
               <a:rPr lang="de-AT" smtClean="0"/>
               <a:t>13.02.2015</a:t>
             </a:fld>
@@ -15602,7 +15517,7 @@
     </p:spTree>
     <p:extLst>
       <p:ext uri="{BB962C8B-B14F-4D97-AF65-F5344CB8AC3E}">
-        <p14:creationId xmlns:p14="http://schemas.microsoft.com/office/powerpoint/2010/main" val="938604773"/>
+        <p14:creationId xmlns:p14="http://schemas.microsoft.com/office/powerpoint/2010/main" val="260349493"/>
       </p:ext>
     </p:extLst>
   </p:cSld>
@@ -15651,53 +15566,62 @@
           <a:bodyPr/>
           <a:lstStyle/>
           <a:p>
-            <a:pPr lvl="0"/>
+            <a:pPr rtl="0" eaLnBrk="1" latinLnBrk="0" hangingPunct="1"/>
+            <a:r>
+              <a:rPr lang="en-US" sz="3600" kern="1200" dirty="0" smtClean="0">
+                <a:solidFill>
+                  <a:schemeClr val="tx1">
+                    <a:lumMod val="85000"/>
+                    <a:lumOff val="15000"/>
+                  </a:schemeClr>
+                </a:solidFill>
+                <a:effectLst/>
+                <a:latin typeface="+mj-lt"/>
+                <a:ea typeface="+mj-ea"/>
+                <a:cs typeface="+mj-cs"/>
+              </a:rPr>
+              <a:t>Frameworks … - Disadvantages</a:t>
+            </a:r>
+            <a:endParaRPr lang="de-AT" dirty="0" smtClean="0">
+              <a:effectLst/>
+            </a:endParaRPr>
+          </a:p>
+        </p:txBody>
+      </p:sp>
+      <p:sp>
+        <p:nvSpPr>
+          <p:cNvPr id="3" name="Inhaltsplatzhalter 2"/>
+          <p:cNvSpPr>
+            <a:spLocks noGrp="1"/>
+          </p:cNvSpPr>
+          <p:nvPr>
+            <p:ph idx="1"/>
+          </p:nvPr>
+        </p:nvSpPr>
+        <p:spPr/>
+        <p:txBody>
+          <a:bodyPr>
+            <a:normAutofit/>
+          </a:bodyPr>
+          <a:lstStyle/>
+          <a:p>
             <a:r>
               <a:rPr lang="en-US" dirty="0" smtClean="0"/>
-              <a:t>What‘s to come</a:t>
+              <a:t>need to be learned</a:t>
+            </a:r>
+          </a:p>
+          <a:p>
+            <a:r>
+              <a:rPr lang="en-US" dirty="0" smtClean="0"/>
+              <a:t>can be limited in the possibilities</a:t>
             </a:r>
             <a:endParaRPr lang="en-US" dirty="0"/>
           </a:p>
-        </p:txBody>
-      </p:sp>
-      <p:sp>
-        <p:nvSpPr>
-          <p:cNvPr id="3" name="Inhaltsplatzhalter 2"/>
-          <p:cNvSpPr>
-            <a:spLocks noGrp="1"/>
-          </p:cNvSpPr>
-          <p:nvPr>
-            <p:ph idx="1"/>
-          </p:nvPr>
-        </p:nvSpPr>
-        <p:spPr/>
-        <p:txBody>
-          <a:bodyPr/>
-          <a:lstStyle/>
           <a:p>
             <a:r>
               <a:rPr lang="en-US" dirty="0" smtClean="0"/>
-              <a:t>Working with Digital Certificates</a:t>
-            </a:r>
-          </a:p>
-          <a:p>
-            <a:r>
-              <a:rPr lang="en-US" dirty="0" smtClean="0"/>
-              <a:t>Securing Application Clients</a:t>
-            </a:r>
-          </a:p>
-          <a:p>
-            <a:r>
-              <a:rPr lang="en-US" dirty="0" smtClean="0"/>
-              <a:t>Security with Enterprise Beans</a:t>
-            </a:r>
-          </a:p>
-          <a:p>
-            <a:r>
-              <a:rPr lang="en-US" dirty="0" smtClean="0"/>
-              <a:t>Further Framework Information</a:t>
-            </a:r>
-            <a:endParaRPr lang="en-US" dirty="0"/>
+              <a:t>need to be trusted</a:t>
+            </a:r>
           </a:p>
         </p:txBody>
       </p:sp>
@@ -15716,7 +15640,7 @@
           <a:bodyPr/>
           <a:lstStyle/>
           <a:p>
-            <a:fld id="{340EB59D-EF96-4D6A-A29A-A1ED56883F40}" type="datetime1">
+            <a:fld id="{3F4C572F-BCA4-4487-8EBD-15EE8D7320C7}" type="datetime1">
               <a:rPr lang="de-AT" smtClean="0"/>
               <a:t>13.02.2015</a:t>
             </a:fld>
@@ -15773,7 +15697,7 @@
     </p:spTree>
     <p:extLst>
       <p:ext uri="{BB962C8B-B14F-4D97-AF65-F5344CB8AC3E}">
-        <p14:creationId xmlns:p14="http://schemas.microsoft.com/office/powerpoint/2010/main" val="3669708446"/>
+        <p14:creationId xmlns:p14="http://schemas.microsoft.com/office/powerpoint/2010/main" val="243032441"/>
       </p:ext>
     </p:extLst>
   </p:cSld>
@@ -15819,14 +15743,12 @@
         </p:nvSpPr>
         <p:spPr/>
         <p:txBody>
-          <a:bodyPr>
-            <a:normAutofit/>
-          </a:bodyPr>
-          <a:lstStyle/>
-          <a:p>
-            <a:pPr lvl="0"/>
-            <a:r>
-              <a:rPr lang="en-US" sz="3600" i="0" kern="1200" noProof="0" dirty="0" smtClean="0">
+          <a:bodyPr/>
+          <a:lstStyle/>
+          <a:p>
+            <a:pPr rtl="0" eaLnBrk="1" latinLnBrk="0" hangingPunct="1"/>
+            <a:r>
+              <a:rPr lang="en-US" sz="3600" kern="1200" dirty="0" smtClean="0">
                 <a:solidFill>
                   <a:schemeClr val="tx1">
                     <a:lumMod val="85000"/>
@@ -15834,10 +15756,15 @@
                   </a:schemeClr>
                 </a:solidFill>
                 <a:effectLst/>
+                <a:latin typeface="+mj-lt"/>
+                <a:ea typeface="+mj-ea"/>
+                <a:cs typeface="+mj-cs"/>
               </a:rPr>
-              <a:t>Sources</a:t>
-            </a:r>
-            <a:endParaRPr lang="en-US" noProof="0" dirty="0"/>
+              <a:t>Frameworks</a:t>
+            </a:r>
+            <a:endParaRPr lang="de-AT" dirty="0" smtClean="0">
+              <a:effectLst/>
+            </a:endParaRPr>
           </a:p>
         </p:txBody>
       </p:sp>
@@ -15858,445 +15785,102 @@
           </a:bodyPr>
           <a:lstStyle/>
           <a:p>
-            <a:pPr lvl="0"/>
-            <a:r>
-              <a:rPr lang="de-AT" sz="800" b="1" dirty="0" err="1"/>
-              <a:t>JavaOne</a:t>
-            </a:r>
-            <a:r>
-              <a:rPr lang="de-AT" sz="800" b="1" dirty="0"/>
-              <a:t> 2014: </a:t>
-            </a:r>
-            <a:r>
-              <a:rPr lang="de-AT" sz="800" dirty="0"/>
-              <a:t>The </a:t>
-            </a:r>
-            <a:r>
-              <a:rPr lang="de-AT" sz="800" dirty="0" err="1"/>
-              <a:t>Anatomy</a:t>
-            </a:r>
-            <a:r>
-              <a:rPr lang="de-AT" sz="800" dirty="0"/>
-              <a:t> </a:t>
-            </a:r>
-            <a:r>
-              <a:rPr lang="de-AT" sz="800" dirty="0" err="1"/>
-              <a:t>of</a:t>
-            </a:r>
-            <a:r>
-              <a:rPr lang="de-AT" sz="800" dirty="0"/>
-              <a:t> a Secure Web </a:t>
-            </a:r>
-            <a:r>
-              <a:rPr lang="de-AT" sz="800" dirty="0" err="1"/>
-              <a:t>Application</a:t>
-            </a:r>
-            <a:r>
-              <a:rPr lang="de-AT" sz="800" dirty="0"/>
-              <a:t> </a:t>
-            </a:r>
-            <a:r>
-              <a:rPr lang="de-AT" sz="800" dirty="0" err="1"/>
-              <a:t>Using</a:t>
-            </a:r>
-            <a:r>
-              <a:rPr lang="de-AT" sz="800" dirty="0"/>
-              <a:t> Java,</a:t>
-            </a:r>
-            <a:br>
-              <a:rPr lang="de-AT" sz="800" dirty="0"/>
-            </a:br>
-            <a:r>
-              <a:rPr lang="de-AT" sz="800" dirty="0"/>
-              <a:t>Shawn </a:t>
-            </a:r>
-            <a:r>
-              <a:rPr lang="de-AT" sz="800" dirty="0" err="1"/>
-              <a:t>McKinney</a:t>
-            </a:r>
-            <a:r>
-              <a:rPr lang="de-AT" sz="800" dirty="0"/>
-              <a:t> &amp; John Field, September 29, 2014</a:t>
-            </a:r>
-            <a:br>
-              <a:rPr lang="de-AT" sz="800" dirty="0"/>
-            </a:br>
-            <a:r>
-              <a:rPr lang="de-AT" sz="800" dirty="0"/>
-              <a:t>San </a:t>
-            </a:r>
-            <a:r>
-              <a:rPr lang="de-AT" sz="800" dirty="0" smtClean="0"/>
-              <a:t>Francisco</a:t>
-            </a:r>
-            <a:endParaRPr lang="de-AT" sz="800" dirty="0"/>
-          </a:p>
-          <a:p>
-            <a:pPr lvl="0"/>
-            <a:r>
-              <a:rPr lang="de-AT" sz="800" b="1" dirty="0"/>
-              <a:t>Java Security: </a:t>
-            </a:r>
-            <a:r>
-              <a:rPr lang="de-AT" sz="800" dirty="0"/>
-              <a:t>Sicherheitslücken identifizieren und vermeiden,</a:t>
-            </a:r>
-            <a:br>
-              <a:rPr lang="de-AT" sz="800" dirty="0"/>
-            </a:br>
-            <a:r>
-              <a:rPr lang="de-AT" sz="800" dirty="0"/>
-              <a:t>Marc Schönefeld, 1. </a:t>
-            </a:r>
-            <a:r>
-              <a:rPr lang="de-AT" sz="800" dirty="0" err="1"/>
-              <a:t>edition</a:t>
-            </a:r>
-            <a:r>
-              <a:rPr lang="de-AT" sz="800" dirty="0"/>
-              <a:t> 2011</a:t>
-            </a:r>
-            <a:br>
-              <a:rPr lang="de-AT" sz="800" dirty="0"/>
-            </a:br>
-            <a:r>
-              <a:rPr lang="de-AT" sz="800" dirty="0"/>
-              <a:t>Publisher: </a:t>
-            </a:r>
-            <a:r>
-              <a:rPr lang="de-AT" sz="800" dirty="0" err="1"/>
-              <a:t>Hüthig</a:t>
-            </a:r>
-            <a:r>
-              <a:rPr lang="de-AT" sz="800" dirty="0"/>
-              <a:t> </a:t>
-            </a:r>
-            <a:r>
-              <a:rPr lang="de-AT" sz="800" dirty="0" err="1"/>
-              <a:t>Jehle</a:t>
-            </a:r>
-            <a:r>
-              <a:rPr lang="de-AT" sz="800" dirty="0"/>
-              <a:t> Rehm GmbH, Heidelberg.</a:t>
-            </a:r>
-            <a:br>
-              <a:rPr lang="de-AT" sz="800" dirty="0"/>
-            </a:br>
-            <a:r>
-              <a:rPr lang="de-AT" sz="800" dirty="0"/>
-              <a:t>ISBN/ISSN </a:t>
-            </a:r>
-            <a:r>
-              <a:rPr lang="de-AT" sz="800" dirty="0" smtClean="0"/>
-              <a:t>978-3-8266-9105-8</a:t>
-            </a:r>
-            <a:endParaRPr lang="de-AT" sz="800" dirty="0"/>
-          </a:p>
-          <a:p>
-            <a:pPr lvl="0"/>
-            <a:r>
-              <a:rPr lang="de-AT" sz="800" b="1" dirty="0"/>
-              <a:t>Enterprise Java Security:</a:t>
-            </a:r>
-            <a:r>
-              <a:rPr lang="de-AT" sz="800" dirty="0"/>
-              <a:t> Building Secure J2EE </a:t>
-            </a:r>
-            <a:r>
-              <a:rPr lang="de-AT" sz="800" dirty="0" err="1"/>
-              <a:t>Applications</a:t>
-            </a:r>
-            <a:r>
-              <a:rPr lang="de-AT" sz="800" dirty="0"/>
-              <a:t>,</a:t>
-            </a:r>
-            <a:br>
-              <a:rPr lang="de-AT" sz="800" dirty="0"/>
-            </a:br>
-            <a:r>
-              <a:rPr lang="de-AT" sz="800" dirty="0"/>
-              <a:t>Marco </a:t>
-            </a:r>
-            <a:r>
-              <a:rPr lang="de-AT" sz="800" dirty="0" err="1"/>
-              <a:t>Pistoia</a:t>
-            </a:r>
-            <a:r>
-              <a:rPr lang="de-AT" sz="800" dirty="0"/>
-              <a:t>, </a:t>
-            </a:r>
-            <a:r>
-              <a:rPr lang="de-AT" sz="800" dirty="0" err="1"/>
-              <a:t>Natara</a:t>
-            </a:r>
-            <a:r>
-              <a:rPr lang="de-AT" sz="800" dirty="0"/>
-              <a:t> j </a:t>
-            </a:r>
-            <a:r>
-              <a:rPr lang="de-AT" sz="800" dirty="0" err="1"/>
-              <a:t>Nagaratnam</a:t>
-            </a:r>
-            <a:r>
-              <a:rPr lang="de-AT" sz="800" dirty="0"/>
-              <a:t>, Larry </a:t>
-            </a:r>
-            <a:r>
-              <a:rPr lang="de-AT" sz="800" dirty="0" err="1"/>
-              <a:t>Koved</a:t>
-            </a:r>
-            <a:r>
-              <a:rPr lang="de-AT" sz="800" dirty="0"/>
-              <a:t>, Anthony </a:t>
-            </a:r>
-            <a:r>
-              <a:rPr lang="de-AT" sz="800" dirty="0" err="1"/>
-              <a:t>Nadalin</a:t>
-            </a:r>
-            <a:r>
-              <a:rPr lang="de-AT" sz="800" dirty="0"/>
-              <a:t>,</a:t>
-            </a:r>
-            <a:br>
-              <a:rPr lang="de-AT" sz="800" dirty="0"/>
-            </a:br>
-            <a:r>
-              <a:rPr lang="de-AT" sz="800" dirty="0"/>
-              <a:t>1. </a:t>
-            </a:r>
-            <a:r>
-              <a:rPr lang="de-AT" sz="800" dirty="0" err="1"/>
-              <a:t>edition</a:t>
-            </a:r>
-            <a:r>
-              <a:rPr lang="de-AT" sz="800" dirty="0"/>
-              <a:t> 2004</a:t>
-            </a:r>
-            <a:br>
-              <a:rPr lang="de-AT" sz="800" dirty="0"/>
-            </a:br>
-            <a:r>
-              <a:rPr lang="de-AT" sz="800" dirty="0"/>
-              <a:t>Publisher: Addison-Wesley Professional.</a:t>
-            </a:r>
-            <a:br>
-              <a:rPr lang="de-AT" sz="800" dirty="0"/>
-            </a:br>
-            <a:r>
-              <a:rPr lang="de-AT" sz="800" dirty="0"/>
-              <a:t>ISBN/ISSN: I SBN </a:t>
-            </a:r>
-            <a:r>
-              <a:rPr lang="de-AT" sz="800" dirty="0" smtClean="0"/>
-              <a:t>0-321-11889-8</a:t>
-            </a:r>
-            <a:endParaRPr lang="de-AT" sz="800" dirty="0"/>
-          </a:p>
-          <a:p>
-            <a:pPr lvl="0"/>
-            <a:r>
-              <a:rPr lang="de-AT" sz="800" b="1" dirty="0"/>
-              <a:t>Official </a:t>
-            </a:r>
-            <a:r>
-              <a:rPr lang="de-AT" sz="800" b="1" dirty="0" err="1"/>
-              <a:t>JavaEE</a:t>
-            </a:r>
-            <a:r>
-              <a:rPr lang="de-AT" sz="800" b="1" dirty="0"/>
-              <a:t> </a:t>
-            </a:r>
-            <a:r>
-              <a:rPr lang="de-AT" sz="800" b="1" dirty="0" err="1"/>
-              <a:t>Documentation</a:t>
-            </a:r>
-            <a:r>
-              <a:rPr lang="de-AT" sz="800" dirty="0"/>
-              <a:t>, Oracle,</a:t>
-            </a:r>
-            <a:br>
-              <a:rPr lang="de-AT" sz="800" dirty="0"/>
-            </a:br>
-            <a:r>
-              <a:rPr lang="de-AT" sz="800" dirty="0"/>
-              <a:t>29.09.2014 http://do cs.oracle.com/</a:t>
-            </a:r>
-            <a:r>
-              <a:rPr lang="de-AT" sz="800" dirty="0" err="1"/>
-              <a:t>javaee</a:t>
-            </a:r>
-            <a:r>
-              <a:rPr lang="de-AT" sz="800" dirty="0"/>
-              <a:t>/7/</a:t>
-            </a:r>
-            <a:r>
-              <a:rPr lang="de-AT" sz="800" dirty="0" err="1"/>
-              <a:t>tutorial</a:t>
-            </a:r>
-            <a:r>
-              <a:rPr lang="de-AT" sz="800" dirty="0"/>
-              <a:t>/do </a:t>
-            </a:r>
-            <a:r>
-              <a:rPr lang="de-AT" sz="800" dirty="0" smtClean="0"/>
-              <a:t>c/security-intro.htm</a:t>
-            </a:r>
-            <a:endParaRPr lang="de-AT" sz="800" dirty="0"/>
-          </a:p>
-          <a:p>
-            <a:pPr lvl="0"/>
-            <a:r>
-              <a:rPr lang="de-AT" sz="800" b="1" dirty="0"/>
-              <a:t>Java EE 6,</a:t>
-            </a:r>
-            <a:r>
-              <a:rPr lang="de-AT" sz="800" dirty="0"/>
-              <a:t/>
-            </a:r>
-            <a:br>
-              <a:rPr lang="de-AT" sz="800" dirty="0"/>
-            </a:br>
-            <a:r>
-              <a:rPr lang="de-AT" sz="800" dirty="0"/>
-              <a:t>Dirk Weil, 1. </a:t>
-            </a:r>
-            <a:r>
-              <a:rPr lang="de-AT" sz="800" dirty="0" err="1"/>
-              <a:t>edition</a:t>
-            </a:r>
-            <a:r>
-              <a:rPr lang="de-AT" sz="800" dirty="0"/>
-              <a:t> 2012</a:t>
-            </a:r>
-            <a:br>
-              <a:rPr lang="de-AT" sz="800" dirty="0"/>
-            </a:br>
-            <a:r>
-              <a:rPr lang="de-AT" sz="800" dirty="0"/>
-              <a:t>Publisher: </a:t>
-            </a:r>
-            <a:r>
-              <a:rPr lang="de-AT" sz="800" dirty="0" err="1"/>
-              <a:t>entwickler.press</a:t>
-            </a:r>
-            <a:r>
-              <a:rPr lang="de-AT" sz="800" dirty="0"/>
-              <a:t/>
-            </a:r>
-            <a:br>
-              <a:rPr lang="de-AT" sz="800" dirty="0"/>
-            </a:br>
-            <a:r>
-              <a:rPr lang="de-AT" sz="800" dirty="0"/>
-              <a:t>ISBN </a:t>
-            </a:r>
-            <a:r>
-              <a:rPr lang="de-AT" sz="800" dirty="0" smtClean="0"/>
-              <a:t>978-3-86802-077-9</a:t>
-            </a:r>
-            <a:endParaRPr lang="de-AT" sz="800" dirty="0"/>
-          </a:p>
-          <a:p>
-            <a:pPr lvl="0"/>
-            <a:r>
-              <a:rPr lang="de-AT" sz="800" b="1" dirty="0"/>
-              <a:t>Java EE 6 </a:t>
-            </a:r>
-            <a:r>
-              <a:rPr lang="de-AT" sz="800" b="1" dirty="0" err="1"/>
-              <a:t>Cookbook</a:t>
-            </a:r>
-            <a:r>
-              <a:rPr lang="de-AT" sz="800" dirty="0"/>
-              <a:t> </a:t>
-            </a:r>
-            <a:r>
-              <a:rPr lang="de-AT" sz="800" dirty="0" err="1"/>
-              <a:t>for</a:t>
-            </a:r>
-            <a:r>
-              <a:rPr lang="de-AT" sz="800" dirty="0"/>
-              <a:t> </a:t>
-            </a:r>
-            <a:r>
-              <a:rPr lang="de-AT" sz="800" dirty="0" err="1"/>
-              <a:t>Securing</a:t>
-            </a:r>
-            <a:r>
-              <a:rPr lang="de-AT" sz="800" dirty="0"/>
-              <a:t>, Tuning, </a:t>
-            </a:r>
-            <a:r>
-              <a:rPr lang="de-AT" sz="800" dirty="0" err="1"/>
-              <a:t>and</a:t>
-            </a:r>
-            <a:r>
-              <a:rPr lang="de-AT" sz="800" dirty="0"/>
-              <a:t> </a:t>
-            </a:r>
-            <a:r>
-              <a:rPr lang="de-AT" sz="800" dirty="0" err="1"/>
-              <a:t>Extending</a:t>
-            </a:r>
-            <a:r>
-              <a:rPr lang="de-AT" sz="800" dirty="0"/>
-              <a:t> Enterprise </a:t>
-            </a:r>
-            <a:r>
-              <a:rPr lang="de-AT" sz="800" dirty="0" err="1"/>
-              <a:t>Applications</a:t>
-            </a:r>
-            <a:r>
-              <a:rPr lang="de-AT" sz="800" dirty="0"/>
-              <a:t>, </a:t>
-            </a:r>
-            <a:br>
-              <a:rPr lang="de-AT" sz="800" dirty="0"/>
-            </a:br>
-            <a:r>
-              <a:rPr lang="de-AT" sz="800" dirty="0"/>
-              <a:t>Mick </a:t>
-            </a:r>
-            <a:r>
-              <a:rPr lang="de-AT" sz="800" dirty="0" err="1"/>
-              <a:t>Knutson</a:t>
-            </a:r>
-            <a:r>
-              <a:rPr lang="de-AT" sz="800" dirty="0"/>
-              <a:t>, </a:t>
-            </a:r>
-            <a:br>
-              <a:rPr lang="de-AT" sz="800" dirty="0"/>
-            </a:br>
-            <a:r>
-              <a:rPr lang="de-AT" sz="800" dirty="0"/>
-              <a:t>1. </a:t>
-            </a:r>
-            <a:r>
-              <a:rPr lang="de-AT" sz="800" dirty="0" err="1"/>
-              <a:t>edition</a:t>
-            </a:r>
-            <a:r>
-              <a:rPr lang="de-AT" sz="800" dirty="0"/>
-              <a:t> June 2012</a:t>
-            </a:r>
-            <a:br>
-              <a:rPr lang="de-AT" sz="800" dirty="0"/>
-            </a:br>
-            <a:r>
-              <a:rPr lang="de-AT" sz="800" dirty="0"/>
-              <a:t>Publisher: Addison-Wesley Professional.</a:t>
-            </a:r>
-            <a:br>
-              <a:rPr lang="de-AT" sz="800" dirty="0"/>
-            </a:br>
-            <a:r>
-              <a:rPr lang="de-AT" sz="800" dirty="0"/>
-              <a:t>ISBN/ISSN: I SBN </a:t>
-            </a:r>
-            <a:r>
-              <a:rPr lang="de-AT" sz="800" dirty="0" smtClean="0"/>
-              <a:t>9781849683166</a:t>
+            <a:pPr marL="342900" lvl="1" indent="-342900"/>
+            <a:r>
+              <a:rPr lang="en-US" sz="2400" dirty="0"/>
+              <a:t>Provide: Authentication, Authorization, </a:t>
+            </a:r>
+            <a:r>
+              <a:rPr lang="en-US" sz="2400" dirty="0" smtClean="0"/>
+              <a:t>Cryptography</a:t>
+            </a:r>
+            <a:endParaRPr lang="en-US" sz="2400" dirty="0" smtClean="0"/>
+          </a:p>
+          <a:p>
+            <a:r>
+              <a:rPr lang="en-US" dirty="0" smtClean="0"/>
+              <a:t>Apache </a:t>
+            </a:r>
+            <a:r>
+              <a:rPr lang="en-US" dirty="0" smtClean="0"/>
+              <a:t>Shiro</a:t>
+            </a:r>
+          </a:p>
+          <a:p>
+            <a:pPr lvl="1"/>
+            <a:r>
+              <a:rPr lang="en-US" dirty="0" smtClean="0"/>
+              <a:t>Simple </a:t>
+            </a:r>
+            <a:r>
+              <a:rPr lang="en-US" dirty="0" smtClean="0"/>
+              <a:t>Code </a:t>
+            </a:r>
+            <a:r>
+              <a:rPr lang="en-US" dirty="0" smtClean="0"/>
+              <a:t>Structure</a:t>
+            </a:r>
+          </a:p>
+          <a:p>
+            <a:pPr lvl="1"/>
+            <a:r>
+              <a:rPr lang="en-US" dirty="0" smtClean="0"/>
+              <a:t>Not bound to HTTP</a:t>
+            </a:r>
+            <a:endParaRPr lang="en-US" dirty="0" smtClean="0"/>
+          </a:p>
+          <a:p>
+            <a:r>
+              <a:rPr lang="en-US" dirty="0" smtClean="0"/>
+              <a:t>Spring Security</a:t>
+            </a:r>
+          </a:p>
+          <a:p>
+            <a:pPr lvl="1"/>
+            <a:r>
+              <a:rPr lang="en-US" dirty="0" smtClean="0"/>
+              <a:t>Very </a:t>
+            </a:r>
+            <a:r>
+              <a:rPr lang="en-US" dirty="0" smtClean="0"/>
+              <a:t>structured</a:t>
+            </a:r>
+          </a:p>
+          <a:p>
+            <a:r>
+              <a:rPr lang="en-US" dirty="0"/>
+              <a:t>JAAS </a:t>
+            </a:r>
+            <a:r>
+              <a:rPr lang="en-US" dirty="0" smtClean="0"/>
+              <a:t>- Java </a:t>
+            </a:r>
+            <a:r>
+              <a:rPr lang="en-US" dirty="0"/>
+              <a:t>Authentication and Authorization </a:t>
+            </a:r>
+            <a:r>
+              <a:rPr lang="en-US" dirty="0" smtClean="0"/>
+              <a:t>Service</a:t>
+            </a:r>
+          </a:p>
+          <a:p>
+            <a:pPr lvl="1"/>
+            <a:r>
+              <a:rPr lang="en-US" dirty="0" smtClean="0"/>
+              <a:t>Included </a:t>
+            </a:r>
+            <a:r>
+              <a:rPr lang="en-US" dirty="0" smtClean="0"/>
+              <a:t>in Java SE since Java 1.4 (</a:t>
+            </a:r>
+            <a:r>
+              <a:rPr lang="de-AT" dirty="0" err="1" smtClean="0"/>
+              <a:t>javax.security.auth</a:t>
+            </a:r>
+            <a:r>
+              <a:rPr lang="de-AT" dirty="0" smtClean="0"/>
+              <a:t>)</a:t>
             </a:r>
           </a:p>
         </p:txBody>
@@ -16316,7 +15900,7 @@
           <a:bodyPr/>
           <a:lstStyle/>
           <a:p>
-            <a:fld id="{680BB08F-6D3B-4E3E-8B05-C729AFCB21AF}" type="datetime1">
+            <a:fld id="{3F4C572F-BCA4-4487-8EBD-15EE8D7320C7}" type="datetime1">
               <a:rPr lang="de-AT" smtClean="0"/>
               <a:t>13.02.2015</a:t>
             </a:fld>
@@ -16373,7 +15957,7 @@
     </p:spTree>
     <p:extLst>
       <p:ext uri="{BB962C8B-B14F-4D97-AF65-F5344CB8AC3E}">
-        <p14:creationId xmlns:p14="http://schemas.microsoft.com/office/powerpoint/2010/main" val="801564242"/>
+        <p14:creationId xmlns:p14="http://schemas.microsoft.com/office/powerpoint/2010/main" val="2337426181"/>
       </p:ext>
     </p:extLst>
   </p:cSld>
@@ -16422,6 +16006,1033 @@
           <a:bodyPr/>
           <a:lstStyle/>
           <a:p>
+            <a:pPr rtl="0" eaLnBrk="1" latinLnBrk="0" hangingPunct="1"/>
+            <a:r>
+              <a:rPr lang="en-US" sz="3600" kern="1200" dirty="0" err="1" smtClean="0">
+                <a:solidFill>
+                  <a:schemeClr val="tx1">
+                    <a:lumMod val="85000"/>
+                    <a:lumOff val="15000"/>
+                  </a:schemeClr>
+                </a:solidFill>
+                <a:effectLst/>
+                <a:latin typeface="+mj-lt"/>
+                <a:ea typeface="+mj-ea"/>
+                <a:cs typeface="+mj-cs"/>
+              </a:rPr>
+              <a:t>Shiro</a:t>
+            </a:r>
+            <a:r>
+              <a:rPr lang="en-US" sz="3600" kern="1200" dirty="0" smtClean="0">
+                <a:solidFill>
+                  <a:schemeClr val="tx1">
+                    <a:lumMod val="85000"/>
+                    <a:lumOff val="15000"/>
+                  </a:schemeClr>
+                </a:solidFill>
+                <a:effectLst/>
+                <a:latin typeface="+mj-lt"/>
+                <a:ea typeface="+mj-ea"/>
+                <a:cs typeface="+mj-cs"/>
+              </a:rPr>
+              <a:t> Example</a:t>
+            </a:r>
+            <a:endParaRPr lang="de-AT" dirty="0" smtClean="0">
+              <a:effectLst/>
+            </a:endParaRPr>
+          </a:p>
+        </p:txBody>
+      </p:sp>
+      <p:sp>
+        <p:nvSpPr>
+          <p:cNvPr id="3" name="Inhaltsplatzhalter 2"/>
+          <p:cNvSpPr>
+            <a:spLocks noGrp="1"/>
+          </p:cNvSpPr>
+          <p:nvPr>
+            <p:ph idx="1"/>
+          </p:nvPr>
+        </p:nvSpPr>
+        <p:spPr>
+          <a:xfrm>
+            <a:off x="2019300" y="2133600"/>
+            <a:ext cx="9485312" cy="3777622"/>
+          </a:xfrm>
+        </p:spPr>
+        <p:txBody>
+          <a:bodyPr>
+            <a:normAutofit/>
+          </a:bodyPr>
+          <a:lstStyle/>
+          <a:p>
+            <a:r>
+              <a:rPr lang="de-AT" b="1" dirty="0"/>
+              <a:t>https://github.com/</a:t>
+            </a:r>
+            <a:r>
+              <a:rPr lang="de-AT" b="1" dirty="0">
+                <a:solidFill>
+                  <a:schemeClr val="accent1">
+                    <a:lumMod val="60000"/>
+                    <a:lumOff val="40000"/>
+                  </a:schemeClr>
+                </a:solidFill>
+              </a:rPr>
+              <a:t>aayvazyan-tgm</a:t>
+            </a:r>
+            <a:r>
+              <a:rPr lang="de-AT" b="1" dirty="0">
+                <a:solidFill>
+                  <a:schemeClr val="tx1"/>
+                </a:solidFill>
+              </a:rPr>
+              <a:t>/</a:t>
+            </a:r>
+            <a:r>
+              <a:rPr lang="de-AT" b="1" dirty="0">
+                <a:solidFill>
+                  <a:schemeClr val="accent1">
+                    <a:lumMod val="60000"/>
+                    <a:lumOff val="40000"/>
+                  </a:schemeClr>
+                </a:solidFill>
+              </a:rPr>
+              <a:t>JavaEESecurityExample</a:t>
+            </a:r>
+          </a:p>
+          <a:p>
+            <a:endParaRPr lang="de-AT" dirty="0" smtClean="0"/>
+          </a:p>
+        </p:txBody>
+      </p:sp>
+      <p:sp>
+        <p:nvSpPr>
+          <p:cNvPr id="4" name="Datumsplatzhalter 3"/>
+          <p:cNvSpPr>
+            <a:spLocks noGrp="1"/>
+          </p:cNvSpPr>
+          <p:nvPr>
+            <p:ph type="dt" sz="half" idx="10"/>
+          </p:nvPr>
+        </p:nvSpPr>
+        <p:spPr/>
+        <p:txBody>
+          <a:bodyPr/>
+          <a:lstStyle/>
+          <a:p>
+            <a:fld id="{3F4C572F-BCA4-4487-8EBD-15EE8D7320C7}" type="datetime1">
+              <a:rPr lang="de-AT" smtClean="0"/>
+              <a:t>13.02.2015</a:t>
+            </a:fld>
+            <a:endParaRPr lang="en-US" dirty="0"/>
+          </a:p>
+        </p:txBody>
+      </p:sp>
+      <p:sp>
+        <p:nvSpPr>
+          <p:cNvPr id="5" name="Fußzeilenplatzhalter 4"/>
+          <p:cNvSpPr>
+            <a:spLocks noGrp="1"/>
+          </p:cNvSpPr>
+          <p:nvPr>
+            <p:ph type="ftr" sz="quarter" idx="11"/>
+          </p:nvPr>
+        </p:nvSpPr>
+        <p:spPr/>
+        <p:txBody>
+          <a:bodyPr/>
+          <a:lstStyle/>
+          <a:p>
+            <a:r>
+              <a:rPr lang="en-US" dirty="0" smtClean="0"/>
+              <a:t>Ari Ayvazyan, Adrian Bergler, Java EE Security</a:t>
+            </a:r>
+            <a:endParaRPr lang="en-US" dirty="0"/>
+          </a:p>
+        </p:txBody>
+      </p:sp>
+      <p:sp>
+        <p:nvSpPr>
+          <p:cNvPr id="6" name="Foliennummernplatzhalter 5"/>
+          <p:cNvSpPr>
+            <a:spLocks noGrp="1"/>
+          </p:cNvSpPr>
+          <p:nvPr>
+            <p:ph type="sldNum" sz="quarter" idx="12"/>
+          </p:nvPr>
+        </p:nvSpPr>
+        <p:spPr/>
+        <p:txBody>
+          <a:bodyPr/>
+          <a:lstStyle/>
+          <a:p>
+            <a:fld id="{D57F1E4F-1CFF-5643-939E-02111984F565}" type="slidenum">
+              <a:rPr lang="en-US" smtClean="0"/>
+              <a:t>26</a:t>
+            </a:fld>
+            <a:endParaRPr lang="en-US" dirty="0"/>
+          </a:p>
+        </p:txBody>
+      </p:sp>
+    </p:spTree>
+    <p:extLst>
+      <p:ext uri="{BB962C8B-B14F-4D97-AF65-F5344CB8AC3E}">
+        <p14:creationId xmlns:p14="http://schemas.microsoft.com/office/powerpoint/2010/main" val="1989554945"/>
+      </p:ext>
+    </p:extLst>
+  </p:cSld>
+  <p:clrMapOvr>
+    <a:masterClrMapping/>
+  </p:clrMapOvr>
+  <p:timing>
+    <p:tnLst>
+      <p:par>
+        <p:cTn id="1" dur="indefinite" restart="never" nodeType="tmRoot"/>
+      </p:par>
+    </p:tnLst>
+  </p:timing>
+</p:sld>
+</file>
+
+<file path=ppt/slides/slide27.xml><?xml version="1.0" encoding="utf-8"?>
+<p:sld xmlns:a="http://schemas.openxmlformats.org/drawingml/2006/main" xmlns:r="http://schemas.openxmlformats.org/officeDocument/2006/relationships" xmlns:p="http://schemas.openxmlformats.org/presentationml/2006/main">
+  <p:cSld>
+    <p:spTree>
+      <p:nvGrpSpPr>
+        <p:cNvPr id="1" name=""/>
+        <p:cNvGrpSpPr/>
+        <p:nvPr/>
+      </p:nvGrpSpPr>
+      <p:grpSpPr>
+        <a:xfrm>
+          <a:off x="0" y="0"/>
+          <a:ext cx="0" cy="0"/>
+          <a:chOff x="0" y="0"/>
+          <a:chExt cx="0" cy="0"/>
+        </a:xfrm>
+      </p:grpSpPr>
+      <p:sp>
+        <p:nvSpPr>
+          <p:cNvPr id="2" name="Titel 1"/>
+          <p:cNvSpPr>
+            <a:spLocks noGrp="1"/>
+          </p:cNvSpPr>
+          <p:nvPr>
+            <p:ph type="title"/>
+          </p:nvPr>
+        </p:nvSpPr>
+        <p:spPr/>
+        <p:txBody>
+          <a:bodyPr/>
+          <a:lstStyle/>
+          <a:p>
+            <a:r>
+              <a:rPr lang="en-US" sz="3600" kern="1200" dirty="0" smtClean="0">
+                <a:solidFill>
+                  <a:schemeClr val="tx1">
+                    <a:lumMod val="85000"/>
+                    <a:lumOff val="15000"/>
+                  </a:schemeClr>
+                </a:solidFill>
+                <a:effectLst/>
+                <a:latin typeface="+mj-lt"/>
+                <a:ea typeface="+mj-ea"/>
+                <a:cs typeface="+mj-cs"/>
+              </a:rPr>
+              <a:t>Output escaping</a:t>
+            </a:r>
+            <a:endParaRPr lang="de-AT" dirty="0"/>
+          </a:p>
+        </p:txBody>
+      </p:sp>
+      <p:sp>
+        <p:nvSpPr>
+          <p:cNvPr id="3" name="Inhaltsplatzhalter 2"/>
+          <p:cNvSpPr>
+            <a:spLocks noGrp="1"/>
+          </p:cNvSpPr>
+          <p:nvPr>
+            <p:ph idx="1"/>
+          </p:nvPr>
+        </p:nvSpPr>
+        <p:spPr/>
+        <p:txBody>
+          <a:bodyPr/>
+          <a:lstStyle/>
+          <a:p>
+            <a:r>
+              <a:rPr lang="en-US" dirty="0" smtClean="0"/>
+              <a:t>Escape user input</a:t>
+            </a:r>
+          </a:p>
+          <a:p>
+            <a:pPr lvl="1"/>
+            <a:r>
+              <a:rPr lang="en-US" dirty="0" smtClean="0"/>
+              <a:t>To prevent </a:t>
+            </a:r>
+            <a:r>
+              <a:rPr lang="en-US" dirty="0" smtClean="0"/>
+              <a:t>injections</a:t>
+            </a:r>
+            <a:endParaRPr lang="en-US" dirty="0" smtClean="0"/>
+          </a:p>
+          <a:p>
+            <a:r>
+              <a:rPr lang="en-US" dirty="0" smtClean="0"/>
+              <a:t>Escape the output</a:t>
+            </a:r>
+          </a:p>
+          <a:p>
+            <a:pPr lvl="1"/>
+            <a:r>
+              <a:rPr lang="en-US" dirty="0" smtClean="0"/>
+              <a:t>To add an extra layer of security (for the user</a:t>
+            </a:r>
+            <a:r>
+              <a:rPr lang="en-US" dirty="0" smtClean="0"/>
+              <a:t>)</a:t>
+            </a:r>
+          </a:p>
+          <a:p>
+            <a:r>
+              <a:rPr lang="en-US" dirty="0" smtClean="0"/>
+              <a:t>Do not show Stack traces</a:t>
+            </a:r>
+          </a:p>
+          <a:p>
+            <a:endParaRPr lang="en-US" dirty="0"/>
+          </a:p>
+          <a:p>
+            <a:r>
+              <a:rPr lang="en-US" dirty="0" smtClean="0"/>
+              <a:t>Use a Framework!</a:t>
+            </a:r>
+            <a:endParaRPr lang="en-US" dirty="0"/>
+          </a:p>
+        </p:txBody>
+      </p:sp>
+      <p:sp>
+        <p:nvSpPr>
+          <p:cNvPr id="4" name="Datumsplatzhalter 3"/>
+          <p:cNvSpPr>
+            <a:spLocks noGrp="1"/>
+          </p:cNvSpPr>
+          <p:nvPr>
+            <p:ph type="dt" sz="half" idx="10"/>
+          </p:nvPr>
+        </p:nvSpPr>
+        <p:spPr/>
+        <p:txBody>
+          <a:bodyPr/>
+          <a:lstStyle/>
+          <a:p>
+            <a:fld id="{73F9A2D8-44B8-467F-9223-0D7436D41992}" type="datetime1">
+              <a:rPr lang="de-AT" smtClean="0"/>
+              <a:t>13.02.2015</a:t>
+            </a:fld>
+            <a:endParaRPr lang="en-US" dirty="0"/>
+          </a:p>
+        </p:txBody>
+      </p:sp>
+      <p:sp>
+        <p:nvSpPr>
+          <p:cNvPr id="5" name="Fußzeilenplatzhalter 4"/>
+          <p:cNvSpPr>
+            <a:spLocks noGrp="1"/>
+          </p:cNvSpPr>
+          <p:nvPr>
+            <p:ph type="ftr" sz="quarter" idx="11"/>
+          </p:nvPr>
+        </p:nvSpPr>
+        <p:spPr/>
+        <p:txBody>
+          <a:bodyPr/>
+          <a:lstStyle/>
+          <a:p>
+            <a:r>
+              <a:rPr lang="en-US" dirty="0" smtClean="0"/>
+              <a:t>Ari Ayvazyan, Adrian Bergler, Java EE Security</a:t>
+            </a:r>
+            <a:endParaRPr lang="en-US" dirty="0"/>
+          </a:p>
+        </p:txBody>
+      </p:sp>
+      <p:sp>
+        <p:nvSpPr>
+          <p:cNvPr id="6" name="Foliennummernplatzhalter 5"/>
+          <p:cNvSpPr>
+            <a:spLocks noGrp="1"/>
+          </p:cNvSpPr>
+          <p:nvPr>
+            <p:ph type="sldNum" sz="quarter" idx="12"/>
+          </p:nvPr>
+        </p:nvSpPr>
+        <p:spPr/>
+        <p:txBody>
+          <a:bodyPr/>
+          <a:lstStyle/>
+          <a:p>
+            <a:fld id="{D57F1E4F-1CFF-5643-939E-02111984F565}" type="slidenum">
+              <a:rPr lang="en-US" smtClean="0"/>
+              <a:t>27</a:t>
+            </a:fld>
+            <a:endParaRPr lang="en-US" dirty="0"/>
+          </a:p>
+        </p:txBody>
+      </p:sp>
+    </p:spTree>
+    <p:extLst>
+      <p:ext uri="{BB962C8B-B14F-4D97-AF65-F5344CB8AC3E}">
+        <p14:creationId xmlns:p14="http://schemas.microsoft.com/office/powerpoint/2010/main" val="938604773"/>
+      </p:ext>
+    </p:extLst>
+  </p:cSld>
+  <p:clrMapOvr>
+    <a:masterClrMapping/>
+  </p:clrMapOvr>
+  <p:timing>
+    <p:tnLst>
+      <p:par>
+        <p:cTn id="1" dur="indefinite" restart="never" nodeType="tmRoot"/>
+      </p:par>
+    </p:tnLst>
+  </p:timing>
+</p:sld>
+</file>
+
+<file path=ppt/slides/slide28.xml><?xml version="1.0" encoding="utf-8"?>
+<p:sld xmlns:a="http://schemas.openxmlformats.org/drawingml/2006/main" xmlns:r="http://schemas.openxmlformats.org/officeDocument/2006/relationships" xmlns:p="http://schemas.openxmlformats.org/presentationml/2006/main">
+  <p:cSld>
+    <p:spTree>
+      <p:nvGrpSpPr>
+        <p:cNvPr id="1" name=""/>
+        <p:cNvGrpSpPr/>
+        <p:nvPr/>
+      </p:nvGrpSpPr>
+      <p:grpSpPr>
+        <a:xfrm>
+          <a:off x="0" y="0"/>
+          <a:ext cx="0" cy="0"/>
+          <a:chOff x="0" y="0"/>
+          <a:chExt cx="0" cy="0"/>
+        </a:xfrm>
+      </p:grpSpPr>
+      <p:sp>
+        <p:nvSpPr>
+          <p:cNvPr id="2" name="Titel 1"/>
+          <p:cNvSpPr>
+            <a:spLocks noGrp="1"/>
+          </p:cNvSpPr>
+          <p:nvPr>
+            <p:ph type="title"/>
+          </p:nvPr>
+        </p:nvSpPr>
+        <p:spPr/>
+        <p:txBody>
+          <a:bodyPr>
+            <a:normAutofit/>
+          </a:bodyPr>
+          <a:lstStyle/>
+          <a:p>
+            <a:pPr lvl="0"/>
+            <a:r>
+              <a:rPr lang="en-US" sz="3600" i="0" kern="1200" noProof="0" dirty="0" smtClean="0">
+                <a:solidFill>
+                  <a:schemeClr val="tx1">
+                    <a:lumMod val="85000"/>
+                    <a:lumOff val="15000"/>
+                  </a:schemeClr>
+                </a:solidFill>
+                <a:effectLst/>
+              </a:rPr>
+              <a:t>Sources</a:t>
+            </a:r>
+            <a:endParaRPr lang="en-US" noProof="0" dirty="0"/>
+          </a:p>
+        </p:txBody>
+      </p:sp>
+      <p:sp>
+        <p:nvSpPr>
+          <p:cNvPr id="3" name="Inhaltsplatzhalter 2"/>
+          <p:cNvSpPr>
+            <a:spLocks noGrp="1"/>
+          </p:cNvSpPr>
+          <p:nvPr>
+            <p:ph idx="1"/>
+          </p:nvPr>
+        </p:nvSpPr>
+        <p:spPr/>
+        <p:txBody>
+          <a:bodyPr>
+            <a:normAutofit/>
+          </a:bodyPr>
+          <a:lstStyle/>
+          <a:p>
+            <a:pPr lvl="0"/>
+            <a:r>
+              <a:rPr lang="de-AT" sz="800" b="1" dirty="0" err="1"/>
+              <a:t>JavaOne</a:t>
+            </a:r>
+            <a:r>
+              <a:rPr lang="de-AT" sz="800" b="1" dirty="0"/>
+              <a:t> 2014: </a:t>
+            </a:r>
+            <a:r>
+              <a:rPr lang="de-AT" sz="800" dirty="0"/>
+              <a:t>The </a:t>
+            </a:r>
+            <a:r>
+              <a:rPr lang="de-AT" sz="800" dirty="0" err="1"/>
+              <a:t>Anatomy</a:t>
+            </a:r>
+            <a:r>
+              <a:rPr lang="de-AT" sz="800" dirty="0"/>
+              <a:t> </a:t>
+            </a:r>
+            <a:r>
+              <a:rPr lang="de-AT" sz="800" dirty="0" err="1"/>
+              <a:t>of</a:t>
+            </a:r>
+            <a:r>
+              <a:rPr lang="de-AT" sz="800" dirty="0"/>
+              <a:t> a Secure Web </a:t>
+            </a:r>
+            <a:r>
+              <a:rPr lang="de-AT" sz="800" dirty="0" err="1"/>
+              <a:t>Application</a:t>
+            </a:r>
+            <a:r>
+              <a:rPr lang="de-AT" sz="800" dirty="0"/>
+              <a:t> </a:t>
+            </a:r>
+            <a:r>
+              <a:rPr lang="de-AT" sz="800" dirty="0" err="1"/>
+              <a:t>Using</a:t>
+            </a:r>
+            <a:r>
+              <a:rPr lang="de-AT" sz="800" dirty="0"/>
+              <a:t> Java,</a:t>
+            </a:r>
+            <a:br>
+              <a:rPr lang="de-AT" sz="800" dirty="0"/>
+            </a:br>
+            <a:r>
+              <a:rPr lang="de-AT" sz="800" dirty="0"/>
+              <a:t>Shawn </a:t>
+            </a:r>
+            <a:r>
+              <a:rPr lang="de-AT" sz="800" dirty="0" err="1"/>
+              <a:t>McKinney</a:t>
+            </a:r>
+            <a:r>
+              <a:rPr lang="de-AT" sz="800" dirty="0"/>
+              <a:t> &amp; John Field, September 29, 2014</a:t>
+            </a:r>
+            <a:br>
+              <a:rPr lang="de-AT" sz="800" dirty="0"/>
+            </a:br>
+            <a:r>
+              <a:rPr lang="de-AT" sz="800" dirty="0"/>
+              <a:t>San </a:t>
+            </a:r>
+            <a:r>
+              <a:rPr lang="de-AT" sz="800" dirty="0" smtClean="0"/>
+              <a:t>Francisco</a:t>
+            </a:r>
+            <a:endParaRPr lang="de-AT" sz="800" dirty="0"/>
+          </a:p>
+          <a:p>
+            <a:pPr lvl="0"/>
+            <a:r>
+              <a:rPr lang="de-AT" sz="800" b="1" dirty="0"/>
+              <a:t>Java Security: </a:t>
+            </a:r>
+            <a:r>
+              <a:rPr lang="de-AT" sz="800" dirty="0"/>
+              <a:t>Sicherheitslücken identifizieren und vermeiden,</a:t>
+            </a:r>
+            <a:br>
+              <a:rPr lang="de-AT" sz="800" dirty="0"/>
+            </a:br>
+            <a:r>
+              <a:rPr lang="de-AT" sz="800" dirty="0"/>
+              <a:t>Marc Schönefeld, 1. </a:t>
+            </a:r>
+            <a:r>
+              <a:rPr lang="de-AT" sz="800" dirty="0" err="1"/>
+              <a:t>edition</a:t>
+            </a:r>
+            <a:r>
+              <a:rPr lang="de-AT" sz="800" dirty="0"/>
+              <a:t> 2011</a:t>
+            </a:r>
+            <a:br>
+              <a:rPr lang="de-AT" sz="800" dirty="0"/>
+            </a:br>
+            <a:r>
+              <a:rPr lang="de-AT" sz="800" dirty="0"/>
+              <a:t>Publisher: </a:t>
+            </a:r>
+            <a:r>
+              <a:rPr lang="de-AT" sz="800" dirty="0" err="1"/>
+              <a:t>Hüthig</a:t>
+            </a:r>
+            <a:r>
+              <a:rPr lang="de-AT" sz="800" dirty="0"/>
+              <a:t> </a:t>
+            </a:r>
+            <a:r>
+              <a:rPr lang="de-AT" sz="800" dirty="0" err="1"/>
+              <a:t>Jehle</a:t>
+            </a:r>
+            <a:r>
+              <a:rPr lang="de-AT" sz="800" dirty="0"/>
+              <a:t> Rehm GmbH, Heidelberg.</a:t>
+            </a:r>
+            <a:br>
+              <a:rPr lang="de-AT" sz="800" dirty="0"/>
+            </a:br>
+            <a:r>
+              <a:rPr lang="de-AT" sz="800" dirty="0"/>
+              <a:t>ISBN/ISSN </a:t>
+            </a:r>
+            <a:r>
+              <a:rPr lang="de-AT" sz="800" dirty="0" smtClean="0"/>
+              <a:t>978-3-8266-9105-8</a:t>
+            </a:r>
+            <a:endParaRPr lang="de-AT" sz="800" dirty="0"/>
+          </a:p>
+          <a:p>
+            <a:pPr lvl="0"/>
+            <a:r>
+              <a:rPr lang="de-AT" sz="800" b="1" dirty="0"/>
+              <a:t>Enterprise Java Security:</a:t>
+            </a:r>
+            <a:r>
+              <a:rPr lang="de-AT" sz="800" dirty="0"/>
+              <a:t> Building Secure J2EE </a:t>
+            </a:r>
+            <a:r>
+              <a:rPr lang="de-AT" sz="800" dirty="0" err="1"/>
+              <a:t>Applications</a:t>
+            </a:r>
+            <a:r>
+              <a:rPr lang="de-AT" sz="800" dirty="0"/>
+              <a:t>,</a:t>
+            </a:r>
+            <a:br>
+              <a:rPr lang="de-AT" sz="800" dirty="0"/>
+            </a:br>
+            <a:r>
+              <a:rPr lang="de-AT" sz="800" dirty="0"/>
+              <a:t>Marco </a:t>
+            </a:r>
+            <a:r>
+              <a:rPr lang="de-AT" sz="800" dirty="0" err="1"/>
+              <a:t>Pistoia</a:t>
+            </a:r>
+            <a:r>
+              <a:rPr lang="de-AT" sz="800" dirty="0"/>
+              <a:t>, </a:t>
+            </a:r>
+            <a:r>
+              <a:rPr lang="de-AT" sz="800" dirty="0" err="1"/>
+              <a:t>Natara</a:t>
+            </a:r>
+            <a:r>
+              <a:rPr lang="de-AT" sz="800" dirty="0"/>
+              <a:t> j </a:t>
+            </a:r>
+            <a:r>
+              <a:rPr lang="de-AT" sz="800" dirty="0" err="1"/>
+              <a:t>Nagaratnam</a:t>
+            </a:r>
+            <a:r>
+              <a:rPr lang="de-AT" sz="800" dirty="0"/>
+              <a:t>, Larry </a:t>
+            </a:r>
+            <a:r>
+              <a:rPr lang="de-AT" sz="800" dirty="0" err="1"/>
+              <a:t>Koved</a:t>
+            </a:r>
+            <a:r>
+              <a:rPr lang="de-AT" sz="800" dirty="0"/>
+              <a:t>, Anthony </a:t>
+            </a:r>
+            <a:r>
+              <a:rPr lang="de-AT" sz="800" dirty="0" err="1"/>
+              <a:t>Nadalin</a:t>
+            </a:r>
+            <a:r>
+              <a:rPr lang="de-AT" sz="800" dirty="0"/>
+              <a:t>,</a:t>
+            </a:r>
+            <a:br>
+              <a:rPr lang="de-AT" sz="800" dirty="0"/>
+            </a:br>
+            <a:r>
+              <a:rPr lang="de-AT" sz="800" dirty="0"/>
+              <a:t>1. </a:t>
+            </a:r>
+            <a:r>
+              <a:rPr lang="de-AT" sz="800" dirty="0" err="1"/>
+              <a:t>edition</a:t>
+            </a:r>
+            <a:r>
+              <a:rPr lang="de-AT" sz="800" dirty="0"/>
+              <a:t> 2004</a:t>
+            </a:r>
+            <a:br>
+              <a:rPr lang="de-AT" sz="800" dirty="0"/>
+            </a:br>
+            <a:r>
+              <a:rPr lang="de-AT" sz="800" dirty="0"/>
+              <a:t>Publisher: Addison-Wesley Professional.</a:t>
+            </a:r>
+            <a:br>
+              <a:rPr lang="de-AT" sz="800" dirty="0"/>
+            </a:br>
+            <a:r>
+              <a:rPr lang="de-AT" sz="800" dirty="0"/>
+              <a:t>ISBN/ISSN: I SBN </a:t>
+            </a:r>
+            <a:r>
+              <a:rPr lang="de-AT" sz="800" dirty="0" smtClean="0"/>
+              <a:t>0-321-11889-8</a:t>
+            </a:r>
+            <a:endParaRPr lang="de-AT" sz="800" dirty="0"/>
+          </a:p>
+          <a:p>
+            <a:pPr lvl="0"/>
+            <a:r>
+              <a:rPr lang="de-AT" sz="800" b="1" dirty="0"/>
+              <a:t>Official </a:t>
+            </a:r>
+            <a:r>
+              <a:rPr lang="de-AT" sz="800" b="1" dirty="0" err="1"/>
+              <a:t>JavaEE</a:t>
+            </a:r>
+            <a:r>
+              <a:rPr lang="de-AT" sz="800" b="1" dirty="0"/>
+              <a:t> </a:t>
+            </a:r>
+            <a:r>
+              <a:rPr lang="de-AT" sz="800" b="1" dirty="0" err="1"/>
+              <a:t>Documentation</a:t>
+            </a:r>
+            <a:r>
+              <a:rPr lang="de-AT" sz="800" dirty="0"/>
+              <a:t>, Oracle,</a:t>
+            </a:r>
+            <a:br>
+              <a:rPr lang="de-AT" sz="800" dirty="0"/>
+            </a:br>
+            <a:r>
+              <a:rPr lang="de-AT" sz="800" dirty="0"/>
+              <a:t>29.09.2014 http://do cs.oracle.com/</a:t>
+            </a:r>
+            <a:r>
+              <a:rPr lang="de-AT" sz="800" dirty="0" err="1"/>
+              <a:t>javaee</a:t>
+            </a:r>
+            <a:r>
+              <a:rPr lang="de-AT" sz="800" dirty="0"/>
+              <a:t>/7/</a:t>
+            </a:r>
+            <a:r>
+              <a:rPr lang="de-AT" sz="800" dirty="0" err="1"/>
+              <a:t>tutorial</a:t>
+            </a:r>
+            <a:r>
+              <a:rPr lang="de-AT" sz="800" dirty="0"/>
+              <a:t>/do </a:t>
+            </a:r>
+            <a:r>
+              <a:rPr lang="de-AT" sz="800" dirty="0" smtClean="0"/>
+              <a:t>c/security-intro.htm</a:t>
+            </a:r>
+            <a:endParaRPr lang="de-AT" sz="800" dirty="0"/>
+          </a:p>
+          <a:p>
+            <a:pPr lvl="0"/>
+            <a:r>
+              <a:rPr lang="de-AT" sz="800" b="1" dirty="0"/>
+              <a:t>Java EE 6,</a:t>
+            </a:r>
+            <a:r>
+              <a:rPr lang="de-AT" sz="800" dirty="0"/>
+              <a:t/>
+            </a:r>
+            <a:br>
+              <a:rPr lang="de-AT" sz="800" dirty="0"/>
+            </a:br>
+            <a:r>
+              <a:rPr lang="de-AT" sz="800" dirty="0"/>
+              <a:t>Dirk Weil, 1. </a:t>
+            </a:r>
+            <a:r>
+              <a:rPr lang="de-AT" sz="800" dirty="0" err="1"/>
+              <a:t>edition</a:t>
+            </a:r>
+            <a:r>
+              <a:rPr lang="de-AT" sz="800" dirty="0"/>
+              <a:t> 2012</a:t>
+            </a:r>
+            <a:br>
+              <a:rPr lang="de-AT" sz="800" dirty="0"/>
+            </a:br>
+            <a:r>
+              <a:rPr lang="de-AT" sz="800" dirty="0"/>
+              <a:t>Publisher: </a:t>
+            </a:r>
+            <a:r>
+              <a:rPr lang="de-AT" sz="800" dirty="0" err="1"/>
+              <a:t>entwickler.press</a:t>
+            </a:r>
+            <a:r>
+              <a:rPr lang="de-AT" sz="800" dirty="0"/>
+              <a:t/>
+            </a:r>
+            <a:br>
+              <a:rPr lang="de-AT" sz="800" dirty="0"/>
+            </a:br>
+            <a:r>
+              <a:rPr lang="de-AT" sz="800" dirty="0"/>
+              <a:t>ISBN </a:t>
+            </a:r>
+            <a:r>
+              <a:rPr lang="de-AT" sz="800" dirty="0" smtClean="0"/>
+              <a:t>978-3-86802-077-9</a:t>
+            </a:r>
+            <a:endParaRPr lang="de-AT" sz="800" dirty="0"/>
+          </a:p>
+          <a:p>
+            <a:pPr lvl="0"/>
+            <a:r>
+              <a:rPr lang="de-AT" sz="800" b="1" dirty="0"/>
+              <a:t>Java EE 6 </a:t>
+            </a:r>
+            <a:r>
+              <a:rPr lang="de-AT" sz="800" b="1" dirty="0" err="1"/>
+              <a:t>Cookbook</a:t>
+            </a:r>
+            <a:r>
+              <a:rPr lang="de-AT" sz="800" dirty="0"/>
+              <a:t> </a:t>
+            </a:r>
+            <a:r>
+              <a:rPr lang="de-AT" sz="800" dirty="0" err="1"/>
+              <a:t>for</a:t>
+            </a:r>
+            <a:r>
+              <a:rPr lang="de-AT" sz="800" dirty="0"/>
+              <a:t> </a:t>
+            </a:r>
+            <a:r>
+              <a:rPr lang="de-AT" sz="800" dirty="0" err="1"/>
+              <a:t>Securing</a:t>
+            </a:r>
+            <a:r>
+              <a:rPr lang="de-AT" sz="800" dirty="0"/>
+              <a:t>, Tuning, </a:t>
+            </a:r>
+            <a:r>
+              <a:rPr lang="de-AT" sz="800" dirty="0" err="1"/>
+              <a:t>and</a:t>
+            </a:r>
+            <a:r>
+              <a:rPr lang="de-AT" sz="800" dirty="0"/>
+              <a:t> </a:t>
+            </a:r>
+            <a:r>
+              <a:rPr lang="de-AT" sz="800" dirty="0" err="1"/>
+              <a:t>Extending</a:t>
+            </a:r>
+            <a:r>
+              <a:rPr lang="de-AT" sz="800" dirty="0"/>
+              <a:t> Enterprise </a:t>
+            </a:r>
+            <a:r>
+              <a:rPr lang="de-AT" sz="800" dirty="0" err="1"/>
+              <a:t>Applications</a:t>
+            </a:r>
+            <a:r>
+              <a:rPr lang="de-AT" sz="800" dirty="0"/>
+              <a:t>, </a:t>
+            </a:r>
+            <a:br>
+              <a:rPr lang="de-AT" sz="800" dirty="0"/>
+            </a:br>
+            <a:r>
+              <a:rPr lang="de-AT" sz="800" dirty="0"/>
+              <a:t>Mick </a:t>
+            </a:r>
+            <a:r>
+              <a:rPr lang="de-AT" sz="800" dirty="0" err="1"/>
+              <a:t>Knutson</a:t>
+            </a:r>
+            <a:r>
+              <a:rPr lang="de-AT" sz="800" dirty="0"/>
+              <a:t>, </a:t>
+            </a:r>
+            <a:br>
+              <a:rPr lang="de-AT" sz="800" dirty="0"/>
+            </a:br>
+            <a:r>
+              <a:rPr lang="de-AT" sz="800" dirty="0"/>
+              <a:t>1. </a:t>
+            </a:r>
+            <a:r>
+              <a:rPr lang="de-AT" sz="800" dirty="0" err="1"/>
+              <a:t>edition</a:t>
+            </a:r>
+            <a:r>
+              <a:rPr lang="de-AT" sz="800" dirty="0"/>
+              <a:t> June 2012</a:t>
+            </a:r>
+            <a:br>
+              <a:rPr lang="de-AT" sz="800" dirty="0"/>
+            </a:br>
+            <a:r>
+              <a:rPr lang="de-AT" sz="800" dirty="0"/>
+              <a:t>Publisher: Addison-Wesley Professional.</a:t>
+            </a:r>
+            <a:br>
+              <a:rPr lang="de-AT" sz="800" dirty="0"/>
+            </a:br>
+            <a:r>
+              <a:rPr lang="de-AT" sz="800" dirty="0"/>
+              <a:t>ISBN/ISSN: I SBN </a:t>
+            </a:r>
+            <a:r>
+              <a:rPr lang="de-AT" sz="800" dirty="0" smtClean="0"/>
+              <a:t>9781849683166</a:t>
+            </a:r>
+          </a:p>
+        </p:txBody>
+      </p:sp>
+      <p:sp>
+        <p:nvSpPr>
+          <p:cNvPr id="4" name="Datumsplatzhalter 3"/>
+          <p:cNvSpPr>
+            <a:spLocks noGrp="1"/>
+          </p:cNvSpPr>
+          <p:nvPr>
+            <p:ph type="dt" sz="half" idx="10"/>
+          </p:nvPr>
+        </p:nvSpPr>
+        <p:spPr/>
+        <p:txBody>
+          <a:bodyPr/>
+          <a:lstStyle/>
+          <a:p>
+            <a:fld id="{680BB08F-6D3B-4E3E-8B05-C729AFCB21AF}" type="datetime1">
+              <a:rPr lang="de-AT" smtClean="0"/>
+              <a:t>13.02.2015</a:t>
+            </a:fld>
+            <a:endParaRPr lang="en-US" dirty="0"/>
+          </a:p>
+        </p:txBody>
+      </p:sp>
+      <p:sp>
+        <p:nvSpPr>
+          <p:cNvPr id="5" name="Fußzeilenplatzhalter 4"/>
+          <p:cNvSpPr>
+            <a:spLocks noGrp="1"/>
+          </p:cNvSpPr>
+          <p:nvPr>
+            <p:ph type="ftr" sz="quarter" idx="11"/>
+          </p:nvPr>
+        </p:nvSpPr>
+        <p:spPr/>
+        <p:txBody>
+          <a:bodyPr/>
+          <a:lstStyle/>
+          <a:p>
+            <a:r>
+              <a:rPr lang="en-US" dirty="0" smtClean="0"/>
+              <a:t>Ari Ayvazyan, Adrian Bergler, Java EE Security</a:t>
+            </a:r>
+            <a:endParaRPr lang="en-US" dirty="0"/>
+          </a:p>
+        </p:txBody>
+      </p:sp>
+      <p:sp>
+        <p:nvSpPr>
+          <p:cNvPr id="6" name="Foliennummernplatzhalter 5"/>
+          <p:cNvSpPr>
+            <a:spLocks noGrp="1"/>
+          </p:cNvSpPr>
+          <p:nvPr>
+            <p:ph type="sldNum" sz="quarter" idx="12"/>
+          </p:nvPr>
+        </p:nvSpPr>
+        <p:spPr/>
+        <p:txBody>
+          <a:bodyPr/>
+          <a:lstStyle/>
+          <a:p>
+            <a:fld id="{D57F1E4F-1CFF-5643-939E-02111984F565}" type="slidenum">
+              <a:rPr lang="en-US" smtClean="0"/>
+              <a:t>28</a:t>
+            </a:fld>
+            <a:endParaRPr lang="en-US" dirty="0"/>
+          </a:p>
+        </p:txBody>
+      </p:sp>
+    </p:spTree>
+    <p:extLst>
+      <p:ext uri="{BB962C8B-B14F-4D97-AF65-F5344CB8AC3E}">
+        <p14:creationId xmlns:p14="http://schemas.microsoft.com/office/powerpoint/2010/main" val="801564242"/>
+      </p:ext>
+    </p:extLst>
+  </p:cSld>
+  <p:clrMapOvr>
+    <a:masterClrMapping/>
+  </p:clrMapOvr>
+  <p:timing>
+    <p:tnLst>
+      <p:par>
+        <p:cTn id="1" dur="indefinite" restart="never" nodeType="tmRoot"/>
+      </p:par>
+    </p:tnLst>
+  </p:timing>
+</p:sld>
+</file>
+
+<file path=ppt/slides/slide29.xml><?xml version="1.0" encoding="utf-8"?>
+<p:sld xmlns:a="http://schemas.openxmlformats.org/drawingml/2006/main" xmlns:r="http://schemas.openxmlformats.org/officeDocument/2006/relationships" xmlns:p="http://schemas.openxmlformats.org/presentationml/2006/main">
+  <p:cSld>
+    <p:spTree>
+      <p:nvGrpSpPr>
+        <p:cNvPr id="1" name=""/>
+        <p:cNvGrpSpPr/>
+        <p:nvPr/>
+      </p:nvGrpSpPr>
+      <p:grpSpPr>
+        <a:xfrm>
+          <a:off x="0" y="0"/>
+          <a:ext cx="0" cy="0"/>
+          <a:chOff x="0" y="0"/>
+          <a:chExt cx="0" cy="0"/>
+        </a:xfrm>
+      </p:grpSpPr>
+      <p:sp>
+        <p:nvSpPr>
+          <p:cNvPr id="2" name="Titel 1"/>
+          <p:cNvSpPr>
+            <a:spLocks noGrp="1"/>
+          </p:cNvSpPr>
+          <p:nvPr>
+            <p:ph type="title"/>
+          </p:nvPr>
+        </p:nvSpPr>
+        <p:spPr/>
+        <p:txBody>
+          <a:bodyPr/>
+          <a:lstStyle/>
+          <a:p>
             <a:pPr lvl="0"/>
             <a:r>
               <a:rPr lang="de-AT" dirty="0" err="1" smtClean="0"/>
@@ -16524,7 +17135,7 @@
           <a:p>
             <a:fld id="{D57F1E4F-1CFF-5643-939E-02111984F565}" type="slidenum">
               <a:rPr lang="en-US" smtClean="0"/>
-              <a:t>26</a:t>
+              <a:t>29</a:t>
             </a:fld>
             <a:endParaRPr lang="en-US" dirty="0"/>
           </a:p>
@@ -16630,7 +17241,6 @@
               <a:rPr lang="de-AT" dirty="0" smtClean="0"/>
               <a:t>Availability</a:t>
             </a:r>
-            <a:endParaRPr lang="de-AT" dirty="0" smtClean="0"/>
           </a:p>
           <a:p>
             <a:endParaRPr lang="de-AT" dirty="0"/>
@@ -17113,7 +17723,6 @@
               <a:rPr lang="de-AT" dirty="0" smtClean="0"/>
               <a:t>Being available in general</a:t>
             </a:r>
-            <a:endParaRPr lang="de-AT" dirty="0" smtClean="0"/>
           </a:p>
         </p:txBody>
       </p:sp>
@@ -17607,7 +18216,7 @@
                 <a:ea typeface="+mj-ea"/>
                 <a:cs typeface="+mj-cs"/>
               </a:rPr>
-              <a:t>Authentication &amp; Authorization</a:t>
+              <a:t>Possible Security Implementations</a:t>
             </a:r>
             <a:endParaRPr lang="de-AT" sz="3600" dirty="0" smtClean="0">
               <a:effectLst/>
@@ -17631,56 +18240,86 @@
           <a:lstStyle/>
           <a:p>
             <a:r>
+              <a:rPr lang="en-US" b="1" dirty="0"/>
+              <a:t>Declarative Security </a:t>
+            </a:r>
+            <a:r>
+              <a:rPr lang="en-US" dirty="0"/>
+              <a:t>(this includes </a:t>
+            </a:r>
+            <a:r>
               <a:rPr lang="en-US" b="1" dirty="0" smtClean="0"/>
-              <a:t>Authentication</a:t>
-            </a:r>
+              <a:t>@Annotations </a:t>
+            </a:r>
+            <a:r>
+              <a:rPr lang="en-US" dirty="0"/>
+              <a:t>and </a:t>
+            </a:r>
+            <a:r>
+              <a:rPr lang="en-US" b="1" dirty="0"/>
+              <a:t>XML-Files</a:t>
+            </a:r>
+            <a:r>
+              <a:rPr lang="en-US" dirty="0" smtClean="0"/>
+              <a:t>)</a:t>
+            </a:r>
+            <a:endParaRPr lang="en-US" dirty="0"/>
           </a:p>
           <a:p>
             <a:pPr lvl="1"/>
             <a:r>
-              <a:rPr lang="en-US" i="1" dirty="0"/>
-              <a:t>Who are you?</a:t>
-            </a:r>
-            <a:endParaRPr lang="en-US" i="1" dirty="0" smtClean="0"/>
+              <a:rPr lang="en-US" dirty="0" smtClean="0"/>
+              <a:t>applied by the </a:t>
+            </a:r>
+            <a:r>
+              <a:rPr lang="en-US" b="1" dirty="0" smtClean="0"/>
+              <a:t>container</a:t>
+            </a:r>
+            <a:r>
+              <a:rPr lang="en-US" dirty="0" smtClean="0"/>
+              <a:t> during </a:t>
+            </a:r>
+            <a:r>
+              <a:rPr lang="en-US" b="1" dirty="0" smtClean="0"/>
+              <a:t>deployment</a:t>
+            </a:r>
+            <a:r>
+              <a:rPr lang="en-US" dirty="0"/>
+              <a:t>.</a:t>
+            </a:r>
+          </a:p>
+          <a:p>
+            <a:r>
+              <a:rPr lang="en-US" b="1" dirty="0"/>
+              <a:t>Programmatic </a:t>
+            </a:r>
+            <a:r>
+              <a:rPr lang="en-US" b="1" dirty="0" smtClean="0"/>
+              <a:t>Security</a:t>
+            </a:r>
+            <a:endParaRPr lang="en-US" b="1" dirty="0"/>
           </a:p>
           <a:p>
             <a:pPr lvl="1"/>
             <a:r>
               <a:rPr lang="en-US" dirty="0" smtClean="0"/>
-              <a:t>Identification</a:t>
-            </a:r>
-            <a:endParaRPr lang="en-US" dirty="0"/>
-          </a:p>
-          <a:p>
-            <a:pPr lvl="1"/>
-            <a:endParaRPr lang="en-US" dirty="0" smtClean="0"/>
-          </a:p>
-          <a:p>
+              <a:t>applied by itself </a:t>
+            </a:r>
             <a:r>
               <a:rPr lang="en-US" b="1" dirty="0" smtClean="0"/>
-              <a:t>Authorization</a:t>
-            </a:r>
-          </a:p>
-          <a:p>
-            <a:pPr lvl="1"/>
-            <a:r>
-              <a:rPr lang="en-US" i="1" dirty="0" smtClean="0"/>
-              <a:t>What are you allowed to do?</a:t>
-            </a:r>
-          </a:p>
-          <a:p>
-            <a:pPr lvl="1"/>
+              <a:t>at</a:t>
+            </a:r>
             <a:r>
               <a:rPr lang="en-US" dirty="0" smtClean="0"/>
-              <a:t>Assignment of Permissions to a </a:t>
-            </a:r>
-            <a:r>
-              <a:rPr lang="en-US" b="1" i="1" dirty="0" smtClean="0"/>
-              <a:t>Authenticated</a:t>
-            </a:r>
-            <a:r>
-              <a:rPr lang="en-US" dirty="0" smtClean="0"/>
-              <a:t> User</a:t>
+              <a:t> </a:t>
+            </a:r>
+            <a:r>
+              <a:rPr lang="en-US" b="1" dirty="0"/>
+              <a:t>runtime</a:t>
+            </a:r>
+            <a:r>
+              <a:rPr lang="en-US" dirty="0"/>
+              <a:t>.</a:t>
             </a:r>
             <a:endParaRPr lang="en-US" dirty="0"/>
           </a:p>

</xml_diff>